<commit_message>
commit update to date code
</commit_message>
<xml_diff>
--- a/Summary.pptx
+++ b/Summary.pptx
@@ -6,6 +6,35 @@
   </p:sldMasterIdLst>
   <p:sldIdLst>
     <p:sldId id="257" r:id="rId2"/>
+    <p:sldId id="258" r:id="rId3"/>
+    <p:sldId id="261" r:id="rId4"/>
+    <p:sldId id="259" r:id="rId5"/>
+    <p:sldId id="260" r:id="rId6"/>
+    <p:sldId id="262" r:id="rId7"/>
+    <p:sldId id="263" r:id="rId8"/>
+    <p:sldId id="264" r:id="rId9"/>
+    <p:sldId id="265" r:id="rId10"/>
+    <p:sldId id="266" r:id="rId11"/>
+    <p:sldId id="267" r:id="rId12"/>
+    <p:sldId id="268" r:id="rId13"/>
+    <p:sldId id="269" r:id="rId14"/>
+    <p:sldId id="270" r:id="rId15"/>
+    <p:sldId id="271" r:id="rId16"/>
+    <p:sldId id="272" r:id="rId17"/>
+    <p:sldId id="273" r:id="rId18"/>
+    <p:sldId id="274" r:id="rId19"/>
+    <p:sldId id="275" r:id="rId20"/>
+    <p:sldId id="276" r:id="rId21"/>
+    <p:sldId id="277" r:id="rId22"/>
+    <p:sldId id="278" r:id="rId23"/>
+    <p:sldId id="279" r:id="rId24"/>
+    <p:sldId id="280" r:id="rId25"/>
+    <p:sldId id="281" r:id="rId26"/>
+    <p:sldId id="282" r:id="rId27"/>
+    <p:sldId id="283" r:id="rId28"/>
+    <p:sldId id="284" r:id="rId29"/>
+    <p:sldId id="285" r:id="rId30"/>
+    <p:sldId id="286" r:id="rId31"/>
   </p:sldIdLst>
   <p:sldSz cx="12192000" cy="6858000"/>
   <p:notesSz cx="6858000" cy="9144000"/>
@@ -104,6 +133,11 @@
       </a:defRPr>
     </a:lvl9pPr>
   </p:defaultTextStyle>
+  <p:extLst>
+    <p:ext uri="{EFAFB233-063F-42B5-8137-9DF3F51BA10A}">
+      <p15:sldGuideLst xmlns:p15="http://schemas.microsoft.com/office/powerpoint/2012/main"/>
+    </p:ext>
+  </p:extLst>
 </p:presentation>
 </file>
 
@@ -254,7 +288,7 @@
           <a:p>
             <a:fld id="{76265137-DA84-4E2F-A9AA-A445D1736825}" type="datetimeFigureOut">
               <a:rPr lang="en-US" smtClean="0"/>
-              <a:t>12/14/2021</a:t>
+              <a:t>12/22/2021</a:t>
             </a:fld>
             <a:endParaRPr lang="en-US"/>
           </a:p>
@@ -452,7 +486,7 @@
           <a:p>
             <a:fld id="{76265137-DA84-4E2F-A9AA-A445D1736825}" type="datetimeFigureOut">
               <a:rPr lang="en-US" smtClean="0"/>
-              <a:t>12/14/2021</a:t>
+              <a:t>12/22/2021</a:t>
             </a:fld>
             <a:endParaRPr lang="en-US"/>
           </a:p>
@@ -660,7 +694,7 @@
           <a:p>
             <a:fld id="{76265137-DA84-4E2F-A9AA-A445D1736825}" type="datetimeFigureOut">
               <a:rPr lang="en-US" smtClean="0"/>
-              <a:t>12/14/2021</a:t>
+              <a:t>12/22/2021</a:t>
             </a:fld>
             <a:endParaRPr lang="en-US"/>
           </a:p>
@@ -858,7 +892,7 @@
           <a:p>
             <a:fld id="{76265137-DA84-4E2F-A9AA-A445D1736825}" type="datetimeFigureOut">
               <a:rPr lang="en-US" smtClean="0"/>
-              <a:t>12/14/2021</a:t>
+              <a:t>12/22/2021</a:t>
             </a:fld>
             <a:endParaRPr lang="en-US"/>
           </a:p>
@@ -1133,7 +1167,7 @@
           <a:p>
             <a:fld id="{76265137-DA84-4E2F-A9AA-A445D1736825}" type="datetimeFigureOut">
               <a:rPr lang="en-US" smtClean="0"/>
-              <a:t>12/14/2021</a:t>
+              <a:t>12/22/2021</a:t>
             </a:fld>
             <a:endParaRPr lang="en-US"/>
           </a:p>
@@ -1398,7 +1432,7 @@
           <a:p>
             <a:fld id="{76265137-DA84-4E2F-A9AA-A445D1736825}" type="datetimeFigureOut">
               <a:rPr lang="en-US" smtClean="0"/>
-              <a:t>12/14/2021</a:t>
+              <a:t>12/22/2021</a:t>
             </a:fld>
             <a:endParaRPr lang="en-US"/>
           </a:p>
@@ -1810,7 +1844,7 @@
           <a:p>
             <a:fld id="{76265137-DA84-4E2F-A9AA-A445D1736825}" type="datetimeFigureOut">
               <a:rPr lang="en-US" smtClean="0"/>
-              <a:t>12/14/2021</a:t>
+              <a:t>12/22/2021</a:t>
             </a:fld>
             <a:endParaRPr lang="en-US"/>
           </a:p>
@@ -1951,7 +1985,7 @@
           <a:p>
             <a:fld id="{76265137-DA84-4E2F-A9AA-A445D1736825}" type="datetimeFigureOut">
               <a:rPr lang="en-US" smtClean="0"/>
-              <a:t>12/14/2021</a:t>
+              <a:t>12/22/2021</a:t>
             </a:fld>
             <a:endParaRPr lang="en-US"/>
           </a:p>
@@ -2064,7 +2098,7 @@
           <a:p>
             <a:fld id="{76265137-DA84-4E2F-A9AA-A445D1736825}" type="datetimeFigureOut">
               <a:rPr lang="en-US" smtClean="0"/>
-              <a:t>12/14/2021</a:t>
+              <a:t>12/22/2021</a:t>
             </a:fld>
             <a:endParaRPr lang="en-US"/>
           </a:p>
@@ -2375,7 +2409,7 @@
           <a:p>
             <a:fld id="{76265137-DA84-4E2F-A9AA-A445D1736825}" type="datetimeFigureOut">
               <a:rPr lang="en-US" smtClean="0"/>
-              <a:t>12/14/2021</a:t>
+              <a:t>12/22/2021</a:t>
             </a:fld>
             <a:endParaRPr lang="en-US"/>
           </a:p>
@@ -2663,7 +2697,7 @@
           <a:p>
             <a:fld id="{76265137-DA84-4E2F-A9AA-A445D1736825}" type="datetimeFigureOut">
               <a:rPr lang="en-US" smtClean="0"/>
-              <a:t>12/14/2021</a:t>
+              <a:t>12/22/2021</a:t>
             </a:fld>
             <a:endParaRPr lang="en-US"/>
           </a:p>
@@ -2904,7 +2938,7 @@
           <a:p>
             <a:fld id="{76265137-DA84-4E2F-A9AA-A445D1736825}" type="datetimeFigureOut">
               <a:rPr lang="en-US" smtClean="0"/>
-              <a:t>12/14/2021</a:t>
+              <a:t>12/22/2021</a:t>
             </a:fld>
             <a:endParaRPr lang="en-US"/>
           </a:p>
@@ -3364,6 +3398,4080 @@
 </p:sld>
 </file>
 
+<file path=ppt/slides/slide10.xml><?xml version="1.0" encoding="utf-8"?>
+<p:sld xmlns:a="http://schemas.openxmlformats.org/drawingml/2006/main" xmlns:r="http://schemas.openxmlformats.org/officeDocument/2006/relationships" xmlns:p="http://schemas.openxmlformats.org/presentationml/2006/main">
+  <p:cSld>
+    <p:spTree>
+      <p:nvGrpSpPr>
+        <p:cNvPr id="1" name=""/>
+        <p:cNvGrpSpPr/>
+        <p:nvPr/>
+      </p:nvGrpSpPr>
+      <p:grpSpPr>
+        <a:xfrm>
+          <a:off x="0" y="0"/>
+          <a:ext cx="0" cy="0"/>
+          <a:chOff x="0" y="0"/>
+          <a:chExt cx="0" cy="0"/>
+        </a:xfrm>
+      </p:grpSpPr>
+      <p:sp>
+        <p:nvSpPr>
+          <p:cNvPr id="2" name="Title 1">
+            <a:extLst>
+              <a:ext uri="{FF2B5EF4-FFF2-40B4-BE49-F238E27FC236}">
+                <a16:creationId xmlns:a16="http://schemas.microsoft.com/office/drawing/2014/main" id="{56BC0774-4335-4864-BA54-A7ACAFDD8F29}"/>
+              </a:ext>
+            </a:extLst>
+          </p:cNvPr>
+          <p:cNvSpPr>
+            <a:spLocks noGrp="1"/>
+          </p:cNvSpPr>
+          <p:nvPr>
+            <p:ph type="title"/>
+          </p:nvPr>
+        </p:nvSpPr>
+        <p:spPr/>
+        <p:txBody>
+          <a:bodyPr/>
+          <a:lstStyle/>
+          <a:p>
+            <a:r>
+              <a:rPr lang="en-US" dirty="0"/>
+              <a:t>Creating Deployment on Kubernetes </a:t>
+            </a:r>
+          </a:p>
+        </p:txBody>
+      </p:sp>
+      <p:sp>
+        <p:nvSpPr>
+          <p:cNvPr id="3" name="Content Placeholder 2">
+            <a:extLst>
+              <a:ext uri="{FF2B5EF4-FFF2-40B4-BE49-F238E27FC236}">
+                <a16:creationId xmlns:a16="http://schemas.microsoft.com/office/drawing/2014/main" id="{0ED06754-DAB3-4AF9-952A-3A9A9FB88DAC}"/>
+              </a:ext>
+            </a:extLst>
+          </p:cNvPr>
+          <p:cNvSpPr>
+            <a:spLocks noGrp="1"/>
+          </p:cNvSpPr>
+          <p:nvPr>
+            <p:ph idx="1"/>
+          </p:nvPr>
+        </p:nvSpPr>
+        <p:spPr/>
+        <p:txBody>
+          <a:bodyPr/>
+          <a:lstStyle/>
+          <a:p>
+            <a:r>
+              <a:rPr lang="en-US" dirty="0" err="1"/>
+              <a:t>kubectl</a:t>
+            </a:r>
+            <a:r>
+              <a:rPr lang="en-US" dirty="0"/>
+              <a:t> create deployment nginx-</a:t>
+            </a:r>
+            <a:r>
+              <a:rPr lang="en-US" dirty="0" err="1"/>
+              <a:t>depl</a:t>
+            </a:r>
+            <a:r>
+              <a:rPr lang="en-US" dirty="0"/>
+              <a:t> --image=nginx</a:t>
+            </a:r>
+          </a:p>
+          <a:p>
+            <a:r>
+              <a:rPr lang="en-US" dirty="0" err="1"/>
+              <a:t>kubectl</a:t>
+            </a:r>
+            <a:r>
+              <a:rPr lang="en-US" dirty="0"/>
+              <a:t> edit deployment nginx-</a:t>
+            </a:r>
+            <a:r>
+              <a:rPr lang="en-US" dirty="0" err="1"/>
+              <a:t>depl</a:t>
+            </a:r>
+            <a:endParaRPr lang="en-US" dirty="0"/>
+          </a:p>
+          <a:p>
+            <a:endParaRPr lang="en-US" dirty="0"/>
+          </a:p>
+        </p:txBody>
+      </p:sp>
+    </p:spTree>
+    <p:extLst>
+      <p:ext uri="{BB962C8B-B14F-4D97-AF65-F5344CB8AC3E}">
+        <p14:creationId xmlns:p14="http://schemas.microsoft.com/office/powerpoint/2010/main" val="3166865542"/>
+      </p:ext>
+    </p:extLst>
+  </p:cSld>
+  <p:clrMapOvr>
+    <a:masterClrMapping/>
+  </p:clrMapOvr>
+</p:sld>
+</file>
+
+<file path=ppt/slides/slide11.xml><?xml version="1.0" encoding="utf-8"?>
+<p:sld xmlns:a="http://schemas.openxmlformats.org/drawingml/2006/main" xmlns:r="http://schemas.openxmlformats.org/officeDocument/2006/relationships" xmlns:p="http://schemas.openxmlformats.org/presentationml/2006/main">
+  <p:cSld>
+    <p:spTree>
+      <p:nvGrpSpPr>
+        <p:cNvPr id="1" name=""/>
+        <p:cNvGrpSpPr/>
+        <p:nvPr/>
+      </p:nvGrpSpPr>
+      <p:grpSpPr>
+        <a:xfrm>
+          <a:off x="0" y="0"/>
+          <a:ext cx="0" cy="0"/>
+          <a:chOff x="0" y="0"/>
+          <a:chExt cx="0" cy="0"/>
+        </a:xfrm>
+      </p:grpSpPr>
+      <p:sp>
+        <p:nvSpPr>
+          <p:cNvPr id="2" name="Title 1">
+            <a:extLst>
+              <a:ext uri="{FF2B5EF4-FFF2-40B4-BE49-F238E27FC236}">
+                <a16:creationId xmlns:a16="http://schemas.microsoft.com/office/drawing/2014/main" id="{56BC0774-4335-4864-BA54-A7ACAFDD8F29}"/>
+              </a:ext>
+            </a:extLst>
+          </p:cNvPr>
+          <p:cNvSpPr>
+            <a:spLocks noGrp="1"/>
+          </p:cNvSpPr>
+          <p:nvPr>
+            <p:ph type="title"/>
+          </p:nvPr>
+        </p:nvSpPr>
+        <p:spPr/>
+        <p:txBody>
+          <a:bodyPr/>
+          <a:lstStyle/>
+          <a:p>
+            <a:r>
+              <a:rPr lang="en-US" dirty="0"/>
+              <a:t>Troubleshooting on Kubernetes </a:t>
+            </a:r>
+          </a:p>
+        </p:txBody>
+      </p:sp>
+      <p:sp>
+        <p:nvSpPr>
+          <p:cNvPr id="3" name="Content Placeholder 2">
+            <a:extLst>
+              <a:ext uri="{FF2B5EF4-FFF2-40B4-BE49-F238E27FC236}">
+                <a16:creationId xmlns:a16="http://schemas.microsoft.com/office/drawing/2014/main" id="{0ED06754-DAB3-4AF9-952A-3A9A9FB88DAC}"/>
+              </a:ext>
+            </a:extLst>
+          </p:cNvPr>
+          <p:cNvSpPr>
+            <a:spLocks noGrp="1"/>
+          </p:cNvSpPr>
+          <p:nvPr>
+            <p:ph idx="1"/>
+          </p:nvPr>
+        </p:nvSpPr>
+        <p:spPr/>
+        <p:txBody>
+          <a:bodyPr>
+            <a:normAutofit/>
+          </a:bodyPr>
+          <a:lstStyle/>
+          <a:p>
+            <a:r>
+              <a:rPr lang="en-US" dirty="0" err="1"/>
+              <a:t>kubectl</a:t>
+            </a:r>
+            <a:r>
+              <a:rPr lang="en-US" dirty="0"/>
+              <a:t> create deployment mongo-</a:t>
+            </a:r>
+            <a:r>
+              <a:rPr lang="en-US" dirty="0" err="1"/>
+              <a:t>depl</a:t>
+            </a:r>
+            <a:r>
+              <a:rPr lang="en-US" dirty="0"/>
+              <a:t> --image=mongo</a:t>
+            </a:r>
+          </a:p>
+          <a:p>
+            <a:r>
+              <a:rPr lang="en-US" dirty="0" err="1"/>
+              <a:t>kubectl</a:t>
+            </a:r>
+            <a:r>
+              <a:rPr lang="en-US" dirty="0"/>
+              <a:t> get pod</a:t>
+            </a:r>
+          </a:p>
+          <a:p>
+            <a:r>
+              <a:rPr lang="en-US" dirty="0" err="1"/>
+              <a:t>kubectl</a:t>
+            </a:r>
+            <a:r>
+              <a:rPr lang="en-US" dirty="0"/>
+              <a:t> get pod -o wide</a:t>
+            </a:r>
+          </a:p>
+          <a:p>
+            <a:r>
+              <a:rPr lang="en-US" dirty="0" err="1"/>
+              <a:t>Kubectl</a:t>
+            </a:r>
+            <a:r>
+              <a:rPr lang="en-US" dirty="0"/>
+              <a:t> logs mongo-depl-5fd6b7d4b4-6czjb</a:t>
+            </a:r>
+          </a:p>
+          <a:p>
+            <a:r>
+              <a:rPr lang="en-US" dirty="0" err="1"/>
+              <a:t>kubectl</a:t>
+            </a:r>
+            <a:r>
+              <a:rPr lang="en-US" dirty="0"/>
+              <a:t> describe pod mongo-depl-5fd6b7d4b4-6czjb</a:t>
+            </a:r>
+          </a:p>
+          <a:p>
+            <a:r>
+              <a:rPr lang="en-US" dirty="0" err="1"/>
+              <a:t>kubectl</a:t>
+            </a:r>
+            <a:r>
+              <a:rPr lang="en-US" dirty="0"/>
+              <a:t> exec mongo-depl-5fd6b7d4b4-6czjb -it </a:t>
+            </a:r>
+            <a:r>
+              <a:rPr lang="en-US" dirty="0" err="1"/>
+              <a:t>sh</a:t>
+            </a:r>
+            <a:endParaRPr lang="en-US" dirty="0"/>
+          </a:p>
+          <a:p>
+            <a:r>
+              <a:rPr lang="en-US" dirty="0" err="1"/>
+              <a:t>kubectl</a:t>
+            </a:r>
+            <a:r>
+              <a:rPr lang="en-US" dirty="0"/>
+              <a:t> get deployment</a:t>
+            </a:r>
+          </a:p>
+          <a:p>
+            <a:r>
+              <a:rPr lang="en-US" dirty="0" err="1"/>
+              <a:t>kubectl</a:t>
+            </a:r>
+            <a:r>
+              <a:rPr lang="en-US" dirty="0"/>
+              <a:t> delete deployment mongo-</a:t>
+            </a:r>
+            <a:r>
+              <a:rPr lang="en-US" dirty="0" err="1"/>
+              <a:t>depl</a:t>
+            </a:r>
+            <a:endParaRPr lang="en-US" dirty="0"/>
+          </a:p>
+          <a:p>
+            <a:endParaRPr lang="en-US" dirty="0"/>
+          </a:p>
+        </p:txBody>
+      </p:sp>
+    </p:spTree>
+    <p:extLst>
+      <p:ext uri="{BB962C8B-B14F-4D97-AF65-F5344CB8AC3E}">
+        <p14:creationId xmlns:p14="http://schemas.microsoft.com/office/powerpoint/2010/main" val="2757692137"/>
+      </p:ext>
+    </p:extLst>
+  </p:cSld>
+  <p:clrMapOvr>
+    <a:masterClrMapping/>
+  </p:clrMapOvr>
+</p:sld>
+</file>
+
+<file path=ppt/slides/slide12.xml><?xml version="1.0" encoding="utf-8"?>
+<p:sld xmlns:a="http://schemas.openxmlformats.org/drawingml/2006/main" xmlns:r="http://schemas.openxmlformats.org/officeDocument/2006/relationships" xmlns:p="http://schemas.openxmlformats.org/presentationml/2006/main">
+  <p:cSld>
+    <p:spTree>
+      <p:nvGrpSpPr>
+        <p:cNvPr id="1" name=""/>
+        <p:cNvGrpSpPr/>
+        <p:nvPr/>
+      </p:nvGrpSpPr>
+      <p:grpSpPr>
+        <a:xfrm>
+          <a:off x="0" y="0"/>
+          <a:ext cx="0" cy="0"/>
+          <a:chOff x="0" y="0"/>
+          <a:chExt cx="0" cy="0"/>
+        </a:xfrm>
+      </p:grpSpPr>
+      <p:sp>
+        <p:nvSpPr>
+          <p:cNvPr id="2" name="Title 1">
+            <a:extLst>
+              <a:ext uri="{FF2B5EF4-FFF2-40B4-BE49-F238E27FC236}">
+                <a16:creationId xmlns:a16="http://schemas.microsoft.com/office/drawing/2014/main" id="{F1537E45-0323-4A42-B1C3-C607C5888BC8}"/>
+              </a:ext>
+            </a:extLst>
+          </p:cNvPr>
+          <p:cNvSpPr>
+            <a:spLocks noGrp="1"/>
+          </p:cNvSpPr>
+          <p:nvPr>
+            <p:ph type="title"/>
+          </p:nvPr>
+        </p:nvSpPr>
+        <p:spPr/>
+        <p:txBody>
+          <a:bodyPr/>
+          <a:lstStyle/>
+          <a:p>
+            <a:r>
+              <a:rPr lang="en-US" dirty="0"/>
+              <a:t>Declarative way Kubernetes</a:t>
+            </a:r>
+          </a:p>
+        </p:txBody>
+      </p:sp>
+      <p:sp>
+        <p:nvSpPr>
+          <p:cNvPr id="3" name="Content Placeholder 2">
+            <a:extLst>
+              <a:ext uri="{FF2B5EF4-FFF2-40B4-BE49-F238E27FC236}">
+                <a16:creationId xmlns:a16="http://schemas.microsoft.com/office/drawing/2014/main" id="{7EE9D71B-439A-4D86-81F5-B3F99EDF0065}"/>
+              </a:ext>
+            </a:extLst>
+          </p:cNvPr>
+          <p:cNvSpPr>
+            <a:spLocks noGrp="1"/>
+          </p:cNvSpPr>
+          <p:nvPr>
+            <p:ph idx="1"/>
+          </p:nvPr>
+        </p:nvSpPr>
+        <p:spPr/>
+        <p:txBody>
+          <a:bodyPr/>
+          <a:lstStyle/>
+          <a:p>
+            <a:r>
+              <a:rPr lang="en-US" dirty="0" err="1"/>
+              <a:t>kubectl</a:t>
+            </a:r>
+            <a:r>
+              <a:rPr lang="en-US" dirty="0"/>
+              <a:t> apply -f .\nginx-</a:t>
+            </a:r>
+            <a:r>
+              <a:rPr lang="en-US" dirty="0" err="1"/>
+              <a:t>depl.yaml</a:t>
+            </a:r>
+            <a:endParaRPr lang="en-US" dirty="0"/>
+          </a:p>
+          <a:p>
+            <a:r>
+              <a:rPr lang="en-US" dirty="0" err="1"/>
+              <a:t>Kubectl</a:t>
+            </a:r>
+            <a:r>
+              <a:rPr lang="en-US" dirty="0"/>
+              <a:t> describe service nginx-service</a:t>
+            </a:r>
+          </a:p>
+        </p:txBody>
+      </p:sp>
+    </p:spTree>
+    <p:extLst>
+      <p:ext uri="{BB962C8B-B14F-4D97-AF65-F5344CB8AC3E}">
+        <p14:creationId xmlns:p14="http://schemas.microsoft.com/office/powerpoint/2010/main" val="838709029"/>
+      </p:ext>
+    </p:extLst>
+  </p:cSld>
+  <p:clrMapOvr>
+    <a:masterClrMapping/>
+  </p:clrMapOvr>
+</p:sld>
+</file>
+
+<file path=ppt/slides/slide13.xml><?xml version="1.0" encoding="utf-8"?>
+<p:sld xmlns:a="http://schemas.openxmlformats.org/drawingml/2006/main" xmlns:r="http://schemas.openxmlformats.org/officeDocument/2006/relationships" xmlns:p="http://schemas.openxmlformats.org/presentationml/2006/main">
+  <p:cSld>
+    <p:spTree>
+      <p:nvGrpSpPr>
+        <p:cNvPr id="1" name=""/>
+        <p:cNvGrpSpPr/>
+        <p:nvPr/>
+      </p:nvGrpSpPr>
+      <p:grpSpPr>
+        <a:xfrm>
+          <a:off x="0" y="0"/>
+          <a:ext cx="0" cy="0"/>
+          <a:chOff x="0" y="0"/>
+          <a:chExt cx="0" cy="0"/>
+        </a:xfrm>
+      </p:grpSpPr>
+      <p:sp>
+        <p:nvSpPr>
+          <p:cNvPr id="2" name="Title 1">
+            <a:extLst>
+              <a:ext uri="{FF2B5EF4-FFF2-40B4-BE49-F238E27FC236}">
+                <a16:creationId xmlns:a16="http://schemas.microsoft.com/office/drawing/2014/main" id="{F687144B-C90F-461C-864E-3F3D700299A5}"/>
+              </a:ext>
+            </a:extLst>
+          </p:cNvPr>
+          <p:cNvSpPr>
+            <a:spLocks noGrp="1"/>
+          </p:cNvSpPr>
+          <p:nvPr>
+            <p:ph type="title"/>
+          </p:nvPr>
+        </p:nvSpPr>
+        <p:spPr/>
+        <p:txBody>
+          <a:bodyPr/>
+          <a:lstStyle/>
+          <a:p>
+            <a:r>
+              <a:rPr lang="en-US" dirty="0"/>
+              <a:t>Kubernetes dashboard UI</a:t>
+            </a:r>
+          </a:p>
+        </p:txBody>
+      </p:sp>
+      <p:sp>
+        <p:nvSpPr>
+          <p:cNvPr id="3" name="Content Placeholder 2">
+            <a:extLst>
+              <a:ext uri="{FF2B5EF4-FFF2-40B4-BE49-F238E27FC236}">
+                <a16:creationId xmlns:a16="http://schemas.microsoft.com/office/drawing/2014/main" id="{A2700D10-0C40-4D97-91A8-440B7FC6BC13}"/>
+              </a:ext>
+            </a:extLst>
+          </p:cNvPr>
+          <p:cNvSpPr>
+            <a:spLocks noGrp="1"/>
+          </p:cNvSpPr>
+          <p:nvPr>
+            <p:ph idx="1"/>
+          </p:nvPr>
+        </p:nvSpPr>
+        <p:spPr/>
+        <p:txBody>
+          <a:bodyPr/>
+          <a:lstStyle/>
+          <a:p>
+            <a:r>
+              <a:rPr lang="en-US" dirty="0">
+                <a:hlinkClick r:id="rId2"/>
+              </a:rPr>
+              <a:t>https://github.com/kubernetes/dashboard</a:t>
+            </a:r>
+            <a:endParaRPr lang="en-US" dirty="0"/>
+          </a:p>
+          <a:p>
+            <a:endParaRPr lang="en-US" dirty="0"/>
+          </a:p>
+          <a:p>
+            <a:r>
+              <a:rPr lang="en-US" dirty="0" err="1"/>
+              <a:t>kubectl</a:t>
+            </a:r>
+            <a:r>
+              <a:rPr lang="en-US" dirty="0"/>
+              <a:t> describe secret -n </a:t>
+            </a:r>
+            <a:r>
+              <a:rPr lang="en-US" dirty="0" err="1"/>
+              <a:t>kube</a:t>
+            </a:r>
+            <a:r>
+              <a:rPr lang="en-US" dirty="0"/>
+              <a:t>-system</a:t>
+            </a:r>
+          </a:p>
+          <a:p>
+            <a:r>
+              <a:rPr lang="en-US" dirty="0" err="1"/>
+              <a:t>Kubectl</a:t>
+            </a:r>
+            <a:r>
+              <a:rPr lang="en-US" dirty="0"/>
+              <a:t> proxy</a:t>
+            </a:r>
+          </a:p>
+          <a:p>
+            <a:endParaRPr lang="en-US" dirty="0"/>
+          </a:p>
+          <a:p>
+            <a:r>
+              <a:rPr lang="en-US" dirty="0" err="1"/>
+              <a:t>Kubectl</a:t>
+            </a:r>
+            <a:r>
+              <a:rPr lang="en-US" dirty="0"/>
+              <a:t> delete -f .\nginx-</a:t>
+            </a:r>
+            <a:r>
+              <a:rPr lang="en-US" dirty="0" err="1"/>
+              <a:t>depl.yaml</a:t>
+            </a:r>
+            <a:endParaRPr lang="en-US" dirty="0"/>
+          </a:p>
+        </p:txBody>
+      </p:sp>
+    </p:spTree>
+    <p:extLst>
+      <p:ext uri="{BB962C8B-B14F-4D97-AF65-F5344CB8AC3E}">
+        <p14:creationId xmlns:p14="http://schemas.microsoft.com/office/powerpoint/2010/main" val="3730514353"/>
+      </p:ext>
+    </p:extLst>
+  </p:cSld>
+  <p:clrMapOvr>
+    <a:masterClrMapping/>
+  </p:clrMapOvr>
+</p:sld>
+</file>
+
+<file path=ppt/slides/slide14.xml><?xml version="1.0" encoding="utf-8"?>
+<p:sld xmlns:a="http://schemas.openxmlformats.org/drawingml/2006/main" xmlns:r="http://schemas.openxmlformats.org/officeDocument/2006/relationships" xmlns:p="http://schemas.openxmlformats.org/presentationml/2006/main">
+  <p:cSld>
+    <p:spTree>
+      <p:nvGrpSpPr>
+        <p:cNvPr id="1" name=""/>
+        <p:cNvGrpSpPr/>
+        <p:nvPr/>
+      </p:nvGrpSpPr>
+      <p:grpSpPr>
+        <a:xfrm>
+          <a:off x="0" y="0"/>
+          <a:ext cx="0" cy="0"/>
+          <a:chOff x="0" y="0"/>
+          <a:chExt cx="0" cy="0"/>
+        </a:xfrm>
+      </p:grpSpPr>
+      <p:sp>
+        <p:nvSpPr>
+          <p:cNvPr id="2" name="Title 1">
+            <a:extLst>
+              <a:ext uri="{FF2B5EF4-FFF2-40B4-BE49-F238E27FC236}">
+                <a16:creationId xmlns:a16="http://schemas.microsoft.com/office/drawing/2014/main" id="{85BE5565-D30A-42BB-827D-960F0030E441}"/>
+              </a:ext>
+            </a:extLst>
+          </p:cNvPr>
+          <p:cNvSpPr>
+            <a:spLocks noGrp="1"/>
+          </p:cNvSpPr>
+          <p:nvPr>
+            <p:ph type="title"/>
+          </p:nvPr>
+        </p:nvSpPr>
+        <p:spPr/>
+        <p:txBody>
+          <a:bodyPr/>
+          <a:lstStyle/>
+          <a:p>
+            <a:r>
+              <a:rPr lang="en-US" dirty="0"/>
+              <a:t>Create Secret for Mongo Db Admin </a:t>
+            </a:r>
+          </a:p>
+        </p:txBody>
+      </p:sp>
+      <p:sp>
+        <p:nvSpPr>
+          <p:cNvPr id="3" name="Content Placeholder 2">
+            <a:extLst>
+              <a:ext uri="{FF2B5EF4-FFF2-40B4-BE49-F238E27FC236}">
+                <a16:creationId xmlns:a16="http://schemas.microsoft.com/office/drawing/2014/main" id="{D9C8053E-D8F4-41D8-B213-56BB5636E323}"/>
+              </a:ext>
+            </a:extLst>
+          </p:cNvPr>
+          <p:cNvSpPr>
+            <a:spLocks noGrp="1"/>
+          </p:cNvSpPr>
+          <p:nvPr>
+            <p:ph idx="1"/>
+          </p:nvPr>
+        </p:nvSpPr>
+        <p:spPr/>
+        <p:txBody>
+          <a:bodyPr/>
+          <a:lstStyle/>
+          <a:p>
+            <a:r>
+              <a:rPr lang="en-US" dirty="0"/>
+              <a:t>Secret should be in BASE64 format</a:t>
+            </a:r>
+          </a:p>
+          <a:p>
+            <a:r>
+              <a:rPr lang="en-US" dirty="0">
+                <a:hlinkClick r:id="rId2"/>
+              </a:rPr>
+              <a:t>https://www.base64encode.org/</a:t>
+            </a:r>
+            <a:endParaRPr lang="en-US" dirty="0"/>
+          </a:p>
+          <a:p>
+            <a:r>
+              <a:rPr lang="en-US" dirty="0" err="1"/>
+              <a:t>Kubectl</a:t>
+            </a:r>
+            <a:r>
+              <a:rPr lang="en-US" dirty="0"/>
+              <a:t> apply –f .\mongo-</a:t>
+            </a:r>
+            <a:r>
+              <a:rPr lang="en-US" dirty="0" err="1"/>
+              <a:t>secret.yaml</a:t>
+            </a:r>
+            <a:endParaRPr lang="en-US" dirty="0"/>
+          </a:p>
+          <a:p>
+            <a:r>
+              <a:rPr lang="en-US" dirty="0" err="1"/>
+              <a:t>Kubectl</a:t>
+            </a:r>
+            <a:r>
+              <a:rPr lang="en-US" dirty="0"/>
+              <a:t> get secret</a:t>
+            </a:r>
+          </a:p>
+        </p:txBody>
+      </p:sp>
+    </p:spTree>
+    <p:extLst>
+      <p:ext uri="{BB962C8B-B14F-4D97-AF65-F5344CB8AC3E}">
+        <p14:creationId xmlns:p14="http://schemas.microsoft.com/office/powerpoint/2010/main" val="639045279"/>
+      </p:ext>
+    </p:extLst>
+  </p:cSld>
+  <p:clrMapOvr>
+    <a:masterClrMapping/>
+  </p:clrMapOvr>
+</p:sld>
+</file>
+
+<file path=ppt/slides/slide15.xml><?xml version="1.0" encoding="utf-8"?>
+<p:sld xmlns:a="http://schemas.openxmlformats.org/drawingml/2006/main" xmlns:r="http://schemas.openxmlformats.org/officeDocument/2006/relationships" xmlns:p="http://schemas.openxmlformats.org/presentationml/2006/main">
+  <p:cSld>
+    <p:spTree>
+      <p:nvGrpSpPr>
+        <p:cNvPr id="1" name=""/>
+        <p:cNvGrpSpPr/>
+        <p:nvPr/>
+      </p:nvGrpSpPr>
+      <p:grpSpPr>
+        <a:xfrm>
+          <a:off x="0" y="0"/>
+          <a:ext cx="0" cy="0"/>
+          <a:chOff x="0" y="0"/>
+          <a:chExt cx="0" cy="0"/>
+        </a:xfrm>
+      </p:grpSpPr>
+      <p:sp>
+        <p:nvSpPr>
+          <p:cNvPr id="2" name="Title 1">
+            <a:extLst>
+              <a:ext uri="{FF2B5EF4-FFF2-40B4-BE49-F238E27FC236}">
+                <a16:creationId xmlns:a16="http://schemas.microsoft.com/office/drawing/2014/main" id="{6D5191CB-BED5-466D-81AD-CC15E7DBAB78}"/>
+              </a:ext>
+            </a:extLst>
+          </p:cNvPr>
+          <p:cNvSpPr>
+            <a:spLocks noGrp="1"/>
+          </p:cNvSpPr>
+          <p:nvPr>
+            <p:ph type="title"/>
+          </p:nvPr>
+        </p:nvSpPr>
+        <p:spPr/>
+        <p:txBody>
+          <a:bodyPr/>
+          <a:lstStyle/>
+          <a:p>
+            <a:r>
+              <a:rPr lang="en-US" dirty="0"/>
+              <a:t>Testing Shopping API </a:t>
+            </a:r>
+            <a:r>
+              <a:rPr lang="en-US" dirty="0" err="1"/>
+              <a:t>yaml</a:t>
+            </a:r>
+            <a:endParaRPr lang="en-US" dirty="0"/>
+          </a:p>
+        </p:txBody>
+      </p:sp>
+      <p:pic>
+        <p:nvPicPr>
+          <p:cNvPr id="5" name="Content Placeholder 4">
+            <a:extLst>
+              <a:ext uri="{FF2B5EF4-FFF2-40B4-BE49-F238E27FC236}">
+                <a16:creationId xmlns:a16="http://schemas.microsoft.com/office/drawing/2014/main" id="{50BB97B1-CE54-42C8-BC16-56D78A68AA3A}"/>
+              </a:ext>
+            </a:extLst>
+          </p:cNvPr>
+          <p:cNvPicPr>
+            <a:picLocks noGrp="1" noChangeAspect="1"/>
+          </p:cNvPicPr>
+          <p:nvPr>
+            <p:ph idx="1"/>
+          </p:nvPr>
+        </p:nvPicPr>
+        <p:blipFill>
+          <a:blip r:embed="rId2"/>
+          <a:stretch>
+            <a:fillRect/>
+          </a:stretch>
+        </p:blipFill>
+        <p:spPr>
+          <a:xfrm>
+            <a:off x="1072949" y="1724025"/>
+            <a:ext cx="1647825" cy="1704975"/>
+          </a:xfrm>
+        </p:spPr>
+      </p:pic>
+      <p:sp>
+        <p:nvSpPr>
+          <p:cNvPr id="6" name="TextBox 5">
+            <a:extLst>
+              <a:ext uri="{FF2B5EF4-FFF2-40B4-BE49-F238E27FC236}">
+                <a16:creationId xmlns:a16="http://schemas.microsoft.com/office/drawing/2014/main" id="{634F32FB-EBE5-4DB7-BDF5-CF5CBF4D9C7D}"/>
+              </a:ext>
+            </a:extLst>
+          </p:cNvPr>
+          <p:cNvSpPr txBox="1"/>
+          <p:nvPr/>
+        </p:nvSpPr>
+        <p:spPr>
+          <a:xfrm>
+            <a:off x="4128117" y="2210540"/>
+            <a:ext cx="4823628" cy="369332"/>
+          </a:xfrm>
+          <a:prstGeom prst="rect">
+            <a:avLst/>
+          </a:prstGeom>
+          <a:noFill/>
+        </p:spPr>
+        <p:txBody>
+          <a:bodyPr wrap="none" rtlCol="0">
+            <a:spAutoFit/>
+          </a:bodyPr>
+          <a:lstStyle/>
+          <a:p>
+            <a:r>
+              <a:rPr lang="en-US" dirty="0" err="1"/>
+              <a:t>Node</a:t>
+            </a:r>
+            <a:r>
+              <a:rPr lang="en-US" altLang="zh-CN" dirty="0" err="1"/>
+              <a:t>Port</a:t>
+            </a:r>
+            <a:r>
+              <a:rPr lang="en-US" altLang="zh-CN" dirty="0"/>
+              <a:t> is used for local testing localhost:31000</a:t>
+            </a:r>
+            <a:endParaRPr lang="en-US" dirty="0"/>
+          </a:p>
+        </p:txBody>
+      </p:sp>
+      <p:sp>
+        <p:nvSpPr>
+          <p:cNvPr id="7" name="TextBox 6">
+            <a:extLst>
+              <a:ext uri="{FF2B5EF4-FFF2-40B4-BE49-F238E27FC236}">
+                <a16:creationId xmlns:a16="http://schemas.microsoft.com/office/drawing/2014/main" id="{B0828FBC-2395-4A80-B1A2-06F01CE8DCA2}"/>
+              </a:ext>
+            </a:extLst>
+          </p:cNvPr>
+          <p:cNvSpPr txBox="1"/>
+          <p:nvPr/>
+        </p:nvSpPr>
+        <p:spPr>
+          <a:xfrm>
+            <a:off x="1004656" y="3579520"/>
+            <a:ext cx="1949765" cy="369332"/>
+          </a:xfrm>
+          <a:prstGeom prst="rect">
+            <a:avLst/>
+          </a:prstGeom>
+          <a:noFill/>
+        </p:spPr>
+        <p:txBody>
+          <a:bodyPr wrap="none" rtlCol="0">
+            <a:spAutoFit/>
+          </a:bodyPr>
+          <a:lstStyle/>
+          <a:p>
+            <a:r>
+              <a:rPr lang="en-US" dirty="0" err="1"/>
+              <a:t>Kubectl</a:t>
+            </a:r>
+            <a:r>
+              <a:rPr lang="en-US" dirty="0"/>
+              <a:t> get service</a:t>
+            </a:r>
+          </a:p>
+        </p:txBody>
+      </p:sp>
+    </p:spTree>
+    <p:extLst>
+      <p:ext uri="{BB962C8B-B14F-4D97-AF65-F5344CB8AC3E}">
+        <p14:creationId xmlns:p14="http://schemas.microsoft.com/office/powerpoint/2010/main" val="2303097428"/>
+      </p:ext>
+    </p:extLst>
+  </p:cSld>
+  <p:clrMapOvr>
+    <a:masterClrMapping/>
+  </p:clrMapOvr>
+</p:sld>
+</file>
+
+<file path=ppt/slides/slide16.xml><?xml version="1.0" encoding="utf-8"?>
+<p:sld xmlns:a="http://schemas.openxmlformats.org/drawingml/2006/main" xmlns:r="http://schemas.openxmlformats.org/officeDocument/2006/relationships" xmlns:p="http://schemas.openxmlformats.org/presentationml/2006/main">
+  <p:cSld>
+    <p:spTree>
+      <p:nvGrpSpPr>
+        <p:cNvPr id="1" name=""/>
+        <p:cNvGrpSpPr/>
+        <p:nvPr/>
+      </p:nvGrpSpPr>
+      <p:grpSpPr>
+        <a:xfrm>
+          <a:off x="0" y="0"/>
+          <a:ext cx="0" cy="0"/>
+          <a:chOff x="0" y="0"/>
+          <a:chExt cx="0" cy="0"/>
+        </a:xfrm>
+      </p:grpSpPr>
+      <p:sp>
+        <p:nvSpPr>
+          <p:cNvPr id="2" name="Title 1">
+            <a:extLst>
+              <a:ext uri="{FF2B5EF4-FFF2-40B4-BE49-F238E27FC236}">
+                <a16:creationId xmlns:a16="http://schemas.microsoft.com/office/drawing/2014/main" id="{FC5646F7-9078-499C-9F5A-5C0147597D07}"/>
+              </a:ext>
+            </a:extLst>
+          </p:cNvPr>
+          <p:cNvSpPr>
+            <a:spLocks noGrp="1"/>
+          </p:cNvSpPr>
+          <p:nvPr>
+            <p:ph type="title"/>
+          </p:nvPr>
+        </p:nvSpPr>
+        <p:spPr/>
+        <p:txBody>
+          <a:bodyPr/>
+          <a:lstStyle/>
+          <a:p>
+            <a:r>
+              <a:rPr lang="en-US" dirty="0"/>
+              <a:t>Define </a:t>
+            </a:r>
+            <a:r>
+              <a:rPr lang="en-US" dirty="0" err="1"/>
+              <a:t>ConfigMap</a:t>
+            </a:r>
+            <a:endParaRPr lang="en-US" dirty="0"/>
+          </a:p>
+        </p:txBody>
+      </p:sp>
+      <p:sp>
+        <p:nvSpPr>
+          <p:cNvPr id="3" name="Content Placeholder 2">
+            <a:extLst>
+              <a:ext uri="{FF2B5EF4-FFF2-40B4-BE49-F238E27FC236}">
+                <a16:creationId xmlns:a16="http://schemas.microsoft.com/office/drawing/2014/main" id="{8116B4D1-C6D6-4A3F-B67A-AD5664F4F62C}"/>
+              </a:ext>
+            </a:extLst>
+          </p:cNvPr>
+          <p:cNvSpPr>
+            <a:spLocks noGrp="1"/>
+          </p:cNvSpPr>
+          <p:nvPr>
+            <p:ph idx="1"/>
+          </p:nvPr>
+        </p:nvSpPr>
+        <p:spPr/>
+        <p:txBody>
+          <a:bodyPr/>
+          <a:lstStyle/>
+          <a:p>
+            <a:r>
+              <a:rPr lang="en-US" dirty="0" err="1"/>
+              <a:t>Kubectl</a:t>
+            </a:r>
+            <a:r>
+              <a:rPr lang="en-US" dirty="0"/>
+              <a:t> get cm</a:t>
+            </a:r>
+          </a:p>
+        </p:txBody>
+      </p:sp>
+    </p:spTree>
+    <p:extLst>
+      <p:ext uri="{BB962C8B-B14F-4D97-AF65-F5344CB8AC3E}">
+        <p14:creationId xmlns:p14="http://schemas.microsoft.com/office/powerpoint/2010/main" val="284817182"/>
+      </p:ext>
+    </p:extLst>
+  </p:cSld>
+  <p:clrMapOvr>
+    <a:masterClrMapping/>
+  </p:clrMapOvr>
+</p:sld>
+</file>
+
+<file path=ppt/slides/slide17.xml><?xml version="1.0" encoding="utf-8"?>
+<p:sld xmlns:a="http://schemas.openxmlformats.org/drawingml/2006/main" xmlns:r="http://schemas.openxmlformats.org/officeDocument/2006/relationships" xmlns:p="http://schemas.openxmlformats.org/presentationml/2006/main">
+  <p:cSld>
+    <p:spTree>
+      <p:nvGrpSpPr>
+        <p:cNvPr id="1" name=""/>
+        <p:cNvGrpSpPr/>
+        <p:nvPr/>
+      </p:nvGrpSpPr>
+      <p:grpSpPr>
+        <a:xfrm>
+          <a:off x="0" y="0"/>
+          <a:ext cx="0" cy="0"/>
+          <a:chOff x="0" y="0"/>
+          <a:chExt cx="0" cy="0"/>
+        </a:xfrm>
+      </p:grpSpPr>
+      <p:sp>
+        <p:nvSpPr>
+          <p:cNvPr id="2" name="Title 1">
+            <a:extLst>
+              <a:ext uri="{FF2B5EF4-FFF2-40B4-BE49-F238E27FC236}">
+                <a16:creationId xmlns:a16="http://schemas.microsoft.com/office/drawing/2014/main" id="{FC5646F7-9078-499C-9F5A-5C0147597D07}"/>
+              </a:ext>
+            </a:extLst>
+          </p:cNvPr>
+          <p:cNvSpPr>
+            <a:spLocks noGrp="1"/>
+          </p:cNvSpPr>
+          <p:nvPr>
+            <p:ph type="title"/>
+          </p:nvPr>
+        </p:nvSpPr>
+        <p:spPr/>
+        <p:txBody>
+          <a:bodyPr/>
+          <a:lstStyle/>
+          <a:p>
+            <a:r>
+              <a:rPr lang="en-US" dirty="0"/>
+              <a:t>Troubleshooting on Kubernetes</a:t>
+            </a:r>
+          </a:p>
+        </p:txBody>
+      </p:sp>
+      <p:sp>
+        <p:nvSpPr>
+          <p:cNvPr id="3" name="Content Placeholder 2">
+            <a:extLst>
+              <a:ext uri="{FF2B5EF4-FFF2-40B4-BE49-F238E27FC236}">
+                <a16:creationId xmlns:a16="http://schemas.microsoft.com/office/drawing/2014/main" id="{8116B4D1-C6D6-4A3F-B67A-AD5664F4F62C}"/>
+              </a:ext>
+            </a:extLst>
+          </p:cNvPr>
+          <p:cNvSpPr>
+            <a:spLocks noGrp="1"/>
+          </p:cNvSpPr>
+          <p:nvPr>
+            <p:ph idx="1"/>
+          </p:nvPr>
+        </p:nvSpPr>
+        <p:spPr/>
+        <p:txBody>
+          <a:bodyPr/>
+          <a:lstStyle/>
+          <a:p>
+            <a:r>
+              <a:rPr lang="en-US" dirty="0" err="1"/>
+              <a:t>Kubectl</a:t>
+            </a:r>
+            <a:r>
+              <a:rPr lang="en-US" dirty="0"/>
+              <a:t> get pod … -o wide</a:t>
+            </a:r>
+          </a:p>
+          <a:p>
+            <a:r>
+              <a:rPr lang="en-US" dirty="0" err="1"/>
+              <a:t>Kubectl</a:t>
+            </a:r>
+            <a:r>
+              <a:rPr lang="en-US" dirty="0"/>
+              <a:t> describe pod …</a:t>
+            </a:r>
+          </a:p>
+          <a:p>
+            <a:r>
+              <a:rPr lang="en-US" dirty="0" err="1"/>
+              <a:t>Kubectl</a:t>
+            </a:r>
+            <a:r>
+              <a:rPr lang="en-US" dirty="0"/>
+              <a:t> logs …</a:t>
+            </a:r>
+          </a:p>
+          <a:p>
+            <a:endParaRPr lang="en-US" dirty="0"/>
+          </a:p>
+          <a:p>
+            <a:r>
+              <a:rPr lang="en-US" dirty="0" err="1"/>
+              <a:t>Kubectl</a:t>
+            </a:r>
+            <a:r>
+              <a:rPr lang="en-US" dirty="0"/>
+              <a:t> delete -f …</a:t>
+            </a:r>
+          </a:p>
+        </p:txBody>
+      </p:sp>
+    </p:spTree>
+    <p:extLst>
+      <p:ext uri="{BB962C8B-B14F-4D97-AF65-F5344CB8AC3E}">
+        <p14:creationId xmlns:p14="http://schemas.microsoft.com/office/powerpoint/2010/main" val="2581433375"/>
+      </p:ext>
+    </p:extLst>
+  </p:cSld>
+  <p:clrMapOvr>
+    <a:masterClrMapping/>
+  </p:clrMapOvr>
+</p:sld>
+</file>
+
+<file path=ppt/slides/slide18.xml><?xml version="1.0" encoding="utf-8"?>
+<p:sld xmlns:a="http://schemas.openxmlformats.org/drawingml/2006/main" xmlns:r="http://schemas.openxmlformats.org/officeDocument/2006/relationships" xmlns:p="http://schemas.openxmlformats.org/presentationml/2006/main">
+  <p:cSld>
+    <p:spTree>
+      <p:nvGrpSpPr>
+        <p:cNvPr id="1" name=""/>
+        <p:cNvGrpSpPr/>
+        <p:nvPr/>
+      </p:nvGrpSpPr>
+      <p:grpSpPr>
+        <a:xfrm>
+          <a:off x="0" y="0"/>
+          <a:ext cx="0" cy="0"/>
+          <a:chOff x="0" y="0"/>
+          <a:chExt cx="0" cy="0"/>
+        </a:xfrm>
+      </p:grpSpPr>
+      <p:sp>
+        <p:nvSpPr>
+          <p:cNvPr id="2" name="Title 1">
+            <a:extLst>
+              <a:ext uri="{FF2B5EF4-FFF2-40B4-BE49-F238E27FC236}">
+                <a16:creationId xmlns:a16="http://schemas.microsoft.com/office/drawing/2014/main" id="{FC5646F7-9078-499C-9F5A-5C0147597D07}"/>
+              </a:ext>
+            </a:extLst>
+          </p:cNvPr>
+          <p:cNvSpPr>
+            <a:spLocks noGrp="1"/>
+          </p:cNvSpPr>
+          <p:nvPr>
+            <p:ph type="title"/>
+          </p:nvPr>
+        </p:nvSpPr>
+        <p:spPr/>
+        <p:txBody>
+          <a:bodyPr/>
+          <a:lstStyle/>
+          <a:p>
+            <a:r>
+              <a:rPr lang="en-US" dirty="0"/>
+              <a:t>Remove all the resources</a:t>
+            </a:r>
+          </a:p>
+        </p:txBody>
+      </p:sp>
+      <p:sp>
+        <p:nvSpPr>
+          <p:cNvPr id="3" name="Content Placeholder 2">
+            <a:extLst>
+              <a:ext uri="{FF2B5EF4-FFF2-40B4-BE49-F238E27FC236}">
+                <a16:creationId xmlns:a16="http://schemas.microsoft.com/office/drawing/2014/main" id="{8116B4D1-C6D6-4A3F-B67A-AD5664F4F62C}"/>
+              </a:ext>
+            </a:extLst>
+          </p:cNvPr>
+          <p:cNvSpPr>
+            <a:spLocks noGrp="1"/>
+          </p:cNvSpPr>
+          <p:nvPr>
+            <p:ph idx="1"/>
+          </p:nvPr>
+        </p:nvSpPr>
+        <p:spPr/>
+        <p:txBody>
+          <a:bodyPr/>
+          <a:lstStyle/>
+          <a:p>
+            <a:r>
+              <a:rPr lang="en-US" dirty="0" err="1"/>
+              <a:t>Kubectl</a:t>
+            </a:r>
+            <a:r>
+              <a:rPr lang="en-US" dirty="0"/>
+              <a:t> delete –f .</a:t>
+            </a:r>
+          </a:p>
+          <a:p>
+            <a:r>
+              <a:rPr lang="en-US" dirty="0"/>
+              <a:t>. means all the file in the current folder</a:t>
+            </a:r>
+          </a:p>
+        </p:txBody>
+      </p:sp>
+    </p:spTree>
+    <p:extLst>
+      <p:ext uri="{BB962C8B-B14F-4D97-AF65-F5344CB8AC3E}">
+        <p14:creationId xmlns:p14="http://schemas.microsoft.com/office/powerpoint/2010/main" val="2881794197"/>
+      </p:ext>
+    </p:extLst>
+  </p:cSld>
+  <p:clrMapOvr>
+    <a:masterClrMapping/>
+  </p:clrMapOvr>
+</p:sld>
+</file>
+
+<file path=ppt/slides/slide19.xml><?xml version="1.0" encoding="utf-8"?>
+<p:sld xmlns:a="http://schemas.openxmlformats.org/drawingml/2006/main" xmlns:r="http://schemas.openxmlformats.org/officeDocument/2006/relationships" xmlns:p="http://schemas.openxmlformats.org/presentationml/2006/main">
+  <p:cSld>
+    <p:spTree>
+      <p:nvGrpSpPr>
+        <p:cNvPr id="1" name=""/>
+        <p:cNvGrpSpPr/>
+        <p:nvPr/>
+      </p:nvGrpSpPr>
+      <p:grpSpPr>
+        <a:xfrm>
+          <a:off x="0" y="0"/>
+          <a:ext cx="0" cy="0"/>
+          <a:chOff x="0" y="0"/>
+          <a:chExt cx="0" cy="0"/>
+        </a:xfrm>
+      </p:grpSpPr>
+      <p:sp>
+        <p:nvSpPr>
+          <p:cNvPr id="2" name="Title 1">
+            <a:extLst>
+              <a:ext uri="{FF2B5EF4-FFF2-40B4-BE49-F238E27FC236}">
+                <a16:creationId xmlns:a16="http://schemas.microsoft.com/office/drawing/2014/main" id="{5F614C4C-5C3B-4EB2-8616-014E4460E3E7}"/>
+              </a:ext>
+            </a:extLst>
+          </p:cNvPr>
+          <p:cNvSpPr>
+            <a:spLocks noGrp="1"/>
+          </p:cNvSpPr>
+          <p:nvPr>
+            <p:ph type="ctrTitle"/>
+          </p:nvPr>
+        </p:nvSpPr>
+        <p:spPr/>
+        <p:txBody>
+          <a:bodyPr>
+            <a:normAutofit fontScale="90000"/>
+          </a:bodyPr>
+          <a:lstStyle/>
+          <a:p>
+            <a:r>
+              <a:rPr lang="en-US" dirty="0"/>
+              <a:t>Deploy on Azure Kubernetes using Azure container registry</a:t>
+            </a:r>
+          </a:p>
+        </p:txBody>
+      </p:sp>
+      <p:sp>
+        <p:nvSpPr>
+          <p:cNvPr id="3" name="Subtitle 2">
+            <a:extLst>
+              <a:ext uri="{FF2B5EF4-FFF2-40B4-BE49-F238E27FC236}">
+                <a16:creationId xmlns:a16="http://schemas.microsoft.com/office/drawing/2014/main" id="{5F68142E-90D8-4B95-B507-F4CCD042A981}"/>
+              </a:ext>
+            </a:extLst>
+          </p:cNvPr>
+          <p:cNvSpPr>
+            <a:spLocks noGrp="1"/>
+          </p:cNvSpPr>
+          <p:nvPr>
+            <p:ph type="subTitle" idx="1"/>
+          </p:nvPr>
+        </p:nvSpPr>
+        <p:spPr/>
+        <p:txBody>
+          <a:bodyPr/>
+          <a:lstStyle/>
+          <a:p>
+            <a:endParaRPr lang="en-US"/>
+          </a:p>
+        </p:txBody>
+      </p:sp>
+    </p:spTree>
+    <p:extLst>
+      <p:ext uri="{BB962C8B-B14F-4D97-AF65-F5344CB8AC3E}">
+        <p14:creationId xmlns:p14="http://schemas.microsoft.com/office/powerpoint/2010/main" val="3800794804"/>
+      </p:ext>
+    </p:extLst>
+  </p:cSld>
+  <p:clrMapOvr>
+    <a:masterClrMapping/>
+  </p:clrMapOvr>
+</p:sld>
+</file>
+
+<file path=ppt/slides/slide2.xml><?xml version="1.0" encoding="utf-8"?>
+<p:sld xmlns:a="http://schemas.openxmlformats.org/drawingml/2006/main" xmlns:r="http://schemas.openxmlformats.org/officeDocument/2006/relationships" xmlns:p="http://schemas.openxmlformats.org/presentationml/2006/main">
+  <p:cSld>
+    <p:spTree>
+      <p:nvGrpSpPr>
+        <p:cNvPr id="1" name=""/>
+        <p:cNvGrpSpPr/>
+        <p:nvPr/>
+      </p:nvGrpSpPr>
+      <p:grpSpPr>
+        <a:xfrm>
+          <a:off x="0" y="0"/>
+          <a:ext cx="0" cy="0"/>
+          <a:chOff x="0" y="0"/>
+          <a:chExt cx="0" cy="0"/>
+        </a:xfrm>
+      </p:grpSpPr>
+      <p:sp>
+        <p:nvSpPr>
+          <p:cNvPr id="2" name="Title 1">
+            <a:extLst>
+              <a:ext uri="{FF2B5EF4-FFF2-40B4-BE49-F238E27FC236}">
+                <a16:creationId xmlns:a16="http://schemas.microsoft.com/office/drawing/2014/main" id="{E72AACC2-ACE9-4182-AF9D-1D4D6D3648EA}"/>
+              </a:ext>
+            </a:extLst>
+          </p:cNvPr>
+          <p:cNvSpPr>
+            <a:spLocks noGrp="1"/>
+          </p:cNvSpPr>
+          <p:nvPr>
+            <p:ph type="title"/>
+          </p:nvPr>
+        </p:nvSpPr>
+        <p:spPr/>
+        <p:txBody>
+          <a:bodyPr/>
+          <a:lstStyle/>
+          <a:p>
+            <a:r>
+              <a:rPr lang="en-US" dirty="0"/>
+              <a:t>Docker command</a:t>
+            </a:r>
+          </a:p>
+        </p:txBody>
+      </p:sp>
+      <p:sp>
+        <p:nvSpPr>
+          <p:cNvPr id="3" name="Content Placeholder 2">
+            <a:extLst>
+              <a:ext uri="{FF2B5EF4-FFF2-40B4-BE49-F238E27FC236}">
+                <a16:creationId xmlns:a16="http://schemas.microsoft.com/office/drawing/2014/main" id="{64E3C2C5-AABA-424C-9471-4C79083E49C4}"/>
+              </a:ext>
+            </a:extLst>
+          </p:cNvPr>
+          <p:cNvSpPr>
+            <a:spLocks noGrp="1"/>
+          </p:cNvSpPr>
+          <p:nvPr>
+            <p:ph idx="1"/>
+          </p:nvPr>
+        </p:nvSpPr>
+        <p:spPr/>
+        <p:txBody>
+          <a:bodyPr>
+            <a:normAutofit lnSpcReduction="10000"/>
+          </a:bodyPr>
+          <a:lstStyle/>
+          <a:p>
+            <a:r>
+              <a:rPr lang="en-US" dirty="0"/>
+              <a:t>docker </a:t>
+            </a:r>
+            <a:r>
+              <a:rPr lang="en-US" dirty="0" err="1"/>
+              <a:t>ps</a:t>
+            </a:r>
+            <a:endParaRPr lang="en-US" dirty="0"/>
+          </a:p>
+          <a:p>
+            <a:r>
+              <a:rPr lang="en-US" dirty="0"/>
+              <a:t>docker </a:t>
+            </a:r>
+            <a:r>
+              <a:rPr lang="en-US" dirty="0" err="1"/>
+              <a:t>ps</a:t>
+            </a:r>
+            <a:r>
+              <a:rPr lang="en-US" dirty="0"/>
+              <a:t> -a</a:t>
+            </a:r>
+          </a:p>
+          <a:p>
+            <a:r>
+              <a:rPr lang="en-US" dirty="0"/>
+              <a:t>docker run –d –p 27017:27017 –name shopping-mongo mongo</a:t>
+            </a:r>
+          </a:p>
+          <a:p>
+            <a:r>
+              <a:rPr lang="en-US" dirty="0"/>
+              <a:t>docker logs –f shopping-mongo</a:t>
+            </a:r>
+          </a:p>
+          <a:p>
+            <a:r>
+              <a:rPr lang="en-US" dirty="0"/>
+              <a:t>docker exec –it shopping-mongo /bin/bash</a:t>
+            </a:r>
+          </a:p>
+          <a:p>
+            <a:r>
+              <a:rPr lang="en-US" dirty="0"/>
+              <a:t>docker stop(rm) $(docker </a:t>
+            </a:r>
+            <a:r>
+              <a:rPr lang="en-US" dirty="0" err="1"/>
+              <a:t>ps</a:t>
+            </a:r>
+            <a:r>
+              <a:rPr lang="en-US" dirty="0"/>
+              <a:t> –</a:t>
+            </a:r>
+            <a:r>
+              <a:rPr lang="en-US" dirty="0" err="1"/>
+              <a:t>aq</a:t>
+            </a:r>
+            <a:r>
+              <a:rPr lang="en-US" dirty="0"/>
+              <a:t>)</a:t>
+            </a:r>
+          </a:p>
+          <a:p>
+            <a:r>
+              <a:rPr lang="en-US" dirty="0"/>
+              <a:t>docker </a:t>
+            </a:r>
+            <a:r>
+              <a:rPr lang="en-US" dirty="0" err="1"/>
+              <a:t>rmi</a:t>
+            </a:r>
+            <a:r>
+              <a:rPr lang="en-US" dirty="0"/>
+              <a:t> $(docker images –q)</a:t>
+            </a:r>
+          </a:p>
+          <a:p>
+            <a:r>
+              <a:rPr lang="en-US" dirty="0"/>
+              <a:t>docker-compose -f docker-</a:t>
+            </a:r>
+            <a:r>
+              <a:rPr lang="en-US" dirty="0" err="1"/>
+              <a:t>compose.yml</a:t>
+            </a:r>
+            <a:r>
+              <a:rPr lang="en-US" dirty="0"/>
+              <a:t> -f docker-</a:t>
+            </a:r>
+            <a:r>
+              <a:rPr lang="en-US" dirty="0" err="1"/>
+              <a:t>compose.override.yml</a:t>
+            </a:r>
+            <a:r>
+              <a:rPr lang="en-US" dirty="0"/>
+              <a:t> up</a:t>
+            </a:r>
+          </a:p>
+          <a:p>
+            <a:endParaRPr lang="en-US" dirty="0"/>
+          </a:p>
+          <a:p>
+            <a:endParaRPr lang="en-US" dirty="0"/>
+          </a:p>
+        </p:txBody>
+      </p:sp>
+    </p:spTree>
+    <p:extLst>
+      <p:ext uri="{BB962C8B-B14F-4D97-AF65-F5344CB8AC3E}">
+        <p14:creationId xmlns:p14="http://schemas.microsoft.com/office/powerpoint/2010/main" val="1354134243"/>
+      </p:ext>
+    </p:extLst>
+  </p:cSld>
+  <p:clrMapOvr>
+    <a:masterClrMapping/>
+  </p:clrMapOvr>
+</p:sld>
+</file>
+
+<file path=ppt/slides/slide20.xml><?xml version="1.0" encoding="utf-8"?>
+<p:sld xmlns:a="http://schemas.openxmlformats.org/drawingml/2006/main" xmlns:r="http://schemas.openxmlformats.org/officeDocument/2006/relationships" xmlns:p="http://schemas.openxmlformats.org/presentationml/2006/main">
+  <p:cSld>
+    <p:spTree>
+      <p:nvGrpSpPr>
+        <p:cNvPr id="1" name=""/>
+        <p:cNvGrpSpPr/>
+        <p:nvPr/>
+      </p:nvGrpSpPr>
+      <p:grpSpPr>
+        <a:xfrm>
+          <a:off x="0" y="0"/>
+          <a:ext cx="0" cy="0"/>
+          <a:chOff x="0" y="0"/>
+          <a:chExt cx="0" cy="0"/>
+        </a:xfrm>
+      </p:grpSpPr>
+      <p:sp>
+        <p:nvSpPr>
+          <p:cNvPr id="2" name="Title 1">
+            <a:extLst>
+              <a:ext uri="{FF2B5EF4-FFF2-40B4-BE49-F238E27FC236}">
+                <a16:creationId xmlns:a16="http://schemas.microsoft.com/office/drawing/2014/main" id="{1A3D9A9E-716D-474D-AC4F-E294A3F32CD0}"/>
+              </a:ext>
+            </a:extLst>
+          </p:cNvPr>
+          <p:cNvSpPr>
+            <a:spLocks noGrp="1"/>
+          </p:cNvSpPr>
+          <p:nvPr>
+            <p:ph type="title"/>
+          </p:nvPr>
+        </p:nvSpPr>
+        <p:spPr/>
+        <p:txBody>
+          <a:bodyPr/>
+          <a:lstStyle/>
+          <a:p>
+            <a:r>
+              <a:rPr lang="en-US" b="0" i="0" dirty="0">
+                <a:solidFill>
+                  <a:srgbClr val="292929"/>
+                </a:solidFill>
+                <a:effectLst/>
+                <a:latin typeface="sohne"/>
+              </a:rPr>
+              <a:t>Azure Container Registry (ACR)</a:t>
+            </a:r>
+            <a:endParaRPr lang="en-US" dirty="0"/>
+          </a:p>
+        </p:txBody>
+      </p:sp>
+      <p:sp>
+        <p:nvSpPr>
+          <p:cNvPr id="3" name="Content Placeholder 2">
+            <a:extLst>
+              <a:ext uri="{FF2B5EF4-FFF2-40B4-BE49-F238E27FC236}">
+                <a16:creationId xmlns:a16="http://schemas.microsoft.com/office/drawing/2014/main" id="{32CFCF73-C6FF-45FD-BC43-4CDFFED4FC0E}"/>
+              </a:ext>
+            </a:extLst>
+          </p:cNvPr>
+          <p:cNvSpPr>
+            <a:spLocks noGrp="1"/>
+          </p:cNvSpPr>
+          <p:nvPr>
+            <p:ph idx="1"/>
+          </p:nvPr>
+        </p:nvSpPr>
+        <p:spPr/>
+        <p:txBody>
+          <a:bodyPr/>
+          <a:lstStyle/>
+          <a:p>
+            <a:endParaRPr lang="en-US"/>
+          </a:p>
+        </p:txBody>
+      </p:sp>
+      <p:pic>
+        <p:nvPicPr>
+          <p:cNvPr id="1026" name="Picture 2">
+            <a:extLst>
+              <a:ext uri="{FF2B5EF4-FFF2-40B4-BE49-F238E27FC236}">
+                <a16:creationId xmlns:a16="http://schemas.microsoft.com/office/drawing/2014/main" id="{0373BA43-36AF-4FE3-A089-F5C92A6C66D5}"/>
+              </a:ext>
+            </a:extLst>
+          </p:cNvPr>
+          <p:cNvPicPr>
+            <a:picLocks noChangeAspect="1" noChangeArrowheads="1"/>
+          </p:cNvPicPr>
+          <p:nvPr/>
+        </p:nvPicPr>
+        <p:blipFill>
+          <a:blip r:embed="rId2">
+            <a:extLst>
+              <a:ext uri="{28A0092B-C50C-407E-A947-70E740481C1C}">
+                <a14:useLocalDpi xmlns:a14="http://schemas.microsoft.com/office/drawing/2010/main" val="0"/>
+              </a:ext>
+            </a:extLst>
+          </a:blip>
+          <a:srcRect/>
+          <a:stretch>
+            <a:fillRect/>
+          </a:stretch>
+        </p:blipFill>
+        <p:spPr bwMode="auto">
+          <a:xfrm>
+            <a:off x="1301411" y="2348012"/>
+            <a:ext cx="9093048" cy="3306563"/>
+          </a:xfrm>
+          <a:prstGeom prst="rect">
+            <a:avLst/>
+          </a:prstGeom>
+          <a:noFill/>
+          <a:extLst>
+            <a:ext uri="{909E8E84-426E-40DD-AFC4-6F175D3DCCD1}">
+              <a14:hiddenFill xmlns:a14="http://schemas.microsoft.com/office/drawing/2010/main">
+                <a:solidFill>
+                  <a:srgbClr val="FFFFFF"/>
+                </a:solidFill>
+              </a14:hiddenFill>
+            </a:ext>
+          </a:extLst>
+        </p:spPr>
+      </p:pic>
+    </p:spTree>
+    <p:extLst>
+      <p:ext uri="{BB962C8B-B14F-4D97-AF65-F5344CB8AC3E}">
+        <p14:creationId xmlns:p14="http://schemas.microsoft.com/office/powerpoint/2010/main" val="3156940008"/>
+      </p:ext>
+    </p:extLst>
+  </p:cSld>
+  <p:clrMapOvr>
+    <a:masterClrMapping/>
+  </p:clrMapOvr>
+</p:sld>
+</file>
+
+<file path=ppt/slides/slide21.xml><?xml version="1.0" encoding="utf-8"?>
+<p:sld xmlns:a="http://schemas.openxmlformats.org/drawingml/2006/main" xmlns:r="http://schemas.openxmlformats.org/officeDocument/2006/relationships" xmlns:p="http://schemas.openxmlformats.org/presentationml/2006/main">
+  <p:cSld>
+    <p:spTree>
+      <p:nvGrpSpPr>
+        <p:cNvPr id="1" name=""/>
+        <p:cNvGrpSpPr/>
+        <p:nvPr/>
+      </p:nvGrpSpPr>
+      <p:grpSpPr>
+        <a:xfrm>
+          <a:off x="0" y="0"/>
+          <a:ext cx="0" cy="0"/>
+          <a:chOff x="0" y="0"/>
+          <a:chExt cx="0" cy="0"/>
+        </a:xfrm>
+      </p:grpSpPr>
+      <p:sp>
+        <p:nvSpPr>
+          <p:cNvPr id="2" name="Title 1">
+            <a:extLst>
+              <a:ext uri="{FF2B5EF4-FFF2-40B4-BE49-F238E27FC236}">
+                <a16:creationId xmlns:a16="http://schemas.microsoft.com/office/drawing/2014/main" id="{1A3D9A9E-716D-474D-AC4F-E294A3F32CD0}"/>
+              </a:ext>
+            </a:extLst>
+          </p:cNvPr>
+          <p:cNvSpPr>
+            <a:spLocks noGrp="1"/>
+          </p:cNvSpPr>
+          <p:nvPr>
+            <p:ph type="title"/>
+          </p:nvPr>
+        </p:nvSpPr>
+        <p:spPr/>
+        <p:txBody>
+          <a:bodyPr/>
+          <a:lstStyle/>
+          <a:p>
+            <a:r>
+              <a:rPr lang="en-US" b="0" i="0" dirty="0">
+                <a:solidFill>
+                  <a:srgbClr val="292929"/>
+                </a:solidFill>
+                <a:effectLst/>
+                <a:latin typeface="sohne"/>
+              </a:rPr>
+              <a:t>Azure Container Registry (ACR)</a:t>
+            </a:r>
+            <a:endParaRPr lang="en-US" dirty="0"/>
+          </a:p>
+        </p:txBody>
+      </p:sp>
+      <p:sp>
+        <p:nvSpPr>
+          <p:cNvPr id="3" name="Content Placeholder 2">
+            <a:extLst>
+              <a:ext uri="{FF2B5EF4-FFF2-40B4-BE49-F238E27FC236}">
+                <a16:creationId xmlns:a16="http://schemas.microsoft.com/office/drawing/2014/main" id="{32CFCF73-C6FF-45FD-BC43-4CDFFED4FC0E}"/>
+              </a:ext>
+            </a:extLst>
+          </p:cNvPr>
+          <p:cNvSpPr>
+            <a:spLocks noGrp="1"/>
+          </p:cNvSpPr>
+          <p:nvPr>
+            <p:ph idx="1"/>
+          </p:nvPr>
+        </p:nvSpPr>
+        <p:spPr/>
+        <p:txBody>
+          <a:bodyPr/>
+          <a:lstStyle/>
+          <a:p>
+            <a:endParaRPr lang="en-US"/>
+          </a:p>
+        </p:txBody>
+      </p:sp>
+      <p:pic>
+        <p:nvPicPr>
+          <p:cNvPr id="2050" name="Picture 2">
+            <a:extLst>
+              <a:ext uri="{FF2B5EF4-FFF2-40B4-BE49-F238E27FC236}">
+                <a16:creationId xmlns:a16="http://schemas.microsoft.com/office/drawing/2014/main" id="{5F6F60FB-234B-45BF-B680-3A0C456AB977}"/>
+              </a:ext>
+            </a:extLst>
+          </p:cNvPr>
+          <p:cNvPicPr>
+            <a:picLocks noChangeAspect="1" noChangeArrowheads="1"/>
+          </p:cNvPicPr>
+          <p:nvPr/>
+        </p:nvPicPr>
+        <p:blipFill>
+          <a:blip r:embed="rId2">
+            <a:extLst>
+              <a:ext uri="{28A0092B-C50C-407E-A947-70E740481C1C}">
+                <a14:useLocalDpi xmlns:a14="http://schemas.microsoft.com/office/drawing/2010/main" val="0"/>
+              </a:ext>
+            </a:extLst>
+          </a:blip>
+          <a:srcRect/>
+          <a:stretch>
+            <a:fillRect/>
+          </a:stretch>
+        </p:blipFill>
+        <p:spPr bwMode="auto">
+          <a:xfrm>
+            <a:off x="2428875" y="1929606"/>
+            <a:ext cx="7334250" cy="4143375"/>
+          </a:xfrm>
+          <a:prstGeom prst="rect">
+            <a:avLst/>
+          </a:prstGeom>
+          <a:noFill/>
+          <a:extLst>
+            <a:ext uri="{909E8E84-426E-40DD-AFC4-6F175D3DCCD1}">
+              <a14:hiddenFill xmlns:a14="http://schemas.microsoft.com/office/drawing/2010/main">
+                <a:solidFill>
+                  <a:srgbClr val="FFFFFF"/>
+                </a:solidFill>
+              </a14:hiddenFill>
+            </a:ext>
+          </a:extLst>
+        </p:spPr>
+      </p:pic>
+    </p:spTree>
+    <p:extLst>
+      <p:ext uri="{BB962C8B-B14F-4D97-AF65-F5344CB8AC3E}">
+        <p14:creationId xmlns:p14="http://schemas.microsoft.com/office/powerpoint/2010/main" val="1354046599"/>
+      </p:ext>
+    </p:extLst>
+  </p:cSld>
+  <p:clrMapOvr>
+    <a:masterClrMapping/>
+  </p:clrMapOvr>
+</p:sld>
+</file>
+
+<file path=ppt/slides/slide22.xml><?xml version="1.0" encoding="utf-8"?>
+<p:sld xmlns:a="http://schemas.openxmlformats.org/drawingml/2006/main" xmlns:r="http://schemas.openxmlformats.org/officeDocument/2006/relationships" xmlns:p="http://schemas.openxmlformats.org/presentationml/2006/main">
+  <p:cSld>
+    <p:spTree>
+      <p:nvGrpSpPr>
+        <p:cNvPr id="1" name=""/>
+        <p:cNvGrpSpPr/>
+        <p:nvPr/>
+      </p:nvGrpSpPr>
+      <p:grpSpPr>
+        <a:xfrm>
+          <a:off x="0" y="0"/>
+          <a:ext cx="0" cy="0"/>
+          <a:chOff x="0" y="0"/>
+          <a:chExt cx="0" cy="0"/>
+        </a:xfrm>
+      </p:grpSpPr>
+      <p:sp>
+        <p:nvSpPr>
+          <p:cNvPr id="2" name="Title 1">
+            <a:extLst>
+              <a:ext uri="{FF2B5EF4-FFF2-40B4-BE49-F238E27FC236}">
+                <a16:creationId xmlns:a16="http://schemas.microsoft.com/office/drawing/2014/main" id="{1A3D9A9E-716D-474D-AC4F-E294A3F32CD0}"/>
+              </a:ext>
+            </a:extLst>
+          </p:cNvPr>
+          <p:cNvSpPr>
+            <a:spLocks noGrp="1"/>
+          </p:cNvSpPr>
+          <p:nvPr>
+            <p:ph type="title"/>
+          </p:nvPr>
+        </p:nvSpPr>
+        <p:spPr/>
+        <p:txBody>
+          <a:bodyPr/>
+          <a:lstStyle/>
+          <a:p>
+            <a:pPr algn="l"/>
+            <a:r>
+              <a:rPr lang="en-US" b="0" i="0" dirty="0">
+                <a:solidFill>
+                  <a:srgbClr val="292929"/>
+                </a:solidFill>
+                <a:effectLst/>
+                <a:latin typeface="sohne"/>
+              </a:rPr>
+              <a:t>Azure Kubernetes Service (AKS)</a:t>
+            </a:r>
+          </a:p>
+        </p:txBody>
+      </p:sp>
+      <p:sp>
+        <p:nvSpPr>
+          <p:cNvPr id="3" name="Content Placeholder 2">
+            <a:extLst>
+              <a:ext uri="{FF2B5EF4-FFF2-40B4-BE49-F238E27FC236}">
+                <a16:creationId xmlns:a16="http://schemas.microsoft.com/office/drawing/2014/main" id="{32CFCF73-C6FF-45FD-BC43-4CDFFED4FC0E}"/>
+              </a:ext>
+            </a:extLst>
+          </p:cNvPr>
+          <p:cNvSpPr>
+            <a:spLocks noGrp="1"/>
+          </p:cNvSpPr>
+          <p:nvPr>
+            <p:ph idx="1"/>
+          </p:nvPr>
+        </p:nvSpPr>
+        <p:spPr/>
+        <p:txBody>
+          <a:bodyPr/>
+          <a:lstStyle/>
+          <a:p>
+            <a:endParaRPr lang="en-US"/>
+          </a:p>
+        </p:txBody>
+      </p:sp>
+      <p:pic>
+        <p:nvPicPr>
+          <p:cNvPr id="3074" name="Picture 2">
+            <a:extLst>
+              <a:ext uri="{FF2B5EF4-FFF2-40B4-BE49-F238E27FC236}">
+                <a16:creationId xmlns:a16="http://schemas.microsoft.com/office/drawing/2014/main" id="{F8F6FBFE-A6B7-4A9F-8FC4-8DDD72A35D0F}"/>
+              </a:ext>
+            </a:extLst>
+          </p:cNvPr>
+          <p:cNvPicPr>
+            <a:picLocks noChangeAspect="1" noChangeArrowheads="1"/>
+          </p:cNvPicPr>
+          <p:nvPr/>
+        </p:nvPicPr>
+        <p:blipFill>
+          <a:blip r:embed="rId2">
+            <a:extLst>
+              <a:ext uri="{28A0092B-C50C-407E-A947-70E740481C1C}">
+                <a14:useLocalDpi xmlns:a14="http://schemas.microsoft.com/office/drawing/2010/main" val="0"/>
+              </a:ext>
+            </a:extLst>
+          </a:blip>
+          <a:srcRect/>
+          <a:stretch>
+            <a:fillRect/>
+          </a:stretch>
+        </p:blipFill>
+        <p:spPr bwMode="auto">
+          <a:xfrm>
+            <a:off x="2295710" y="1890713"/>
+            <a:ext cx="7334250" cy="4286250"/>
+          </a:xfrm>
+          <a:prstGeom prst="rect">
+            <a:avLst/>
+          </a:prstGeom>
+          <a:noFill/>
+          <a:extLst>
+            <a:ext uri="{909E8E84-426E-40DD-AFC4-6F175D3DCCD1}">
+              <a14:hiddenFill xmlns:a14="http://schemas.microsoft.com/office/drawing/2010/main">
+                <a:solidFill>
+                  <a:srgbClr val="FFFFFF"/>
+                </a:solidFill>
+              </a14:hiddenFill>
+            </a:ext>
+          </a:extLst>
+        </p:spPr>
+      </p:pic>
+    </p:spTree>
+    <p:extLst>
+      <p:ext uri="{BB962C8B-B14F-4D97-AF65-F5344CB8AC3E}">
+        <p14:creationId xmlns:p14="http://schemas.microsoft.com/office/powerpoint/2010/main" val="3624295120"/>
+      </p:ext>
+    </p:extLst>
+  </p:cSld>
+  <p:clrMapOvr>
+    <a:masterClrMapping/>
+  </p:clrMapOvr>
+</p:sld>
+</file>
+
+<file path=ppt/slides/slide23.xml><?xml version="1.0" encoding="utf-8"?>
+<p:sld xmlns:a="http://schemas.openxmlformats.org/drawingml/2006/main" xmlns:r="http://schemas.openxmlformats.org/officeDocument/2006/relationships" xmlns:p="http://schemas.openxmlformats.org/presentationml/2006/main">
+  <p:cSld>
+    <p:spTree>
+      <p:nvGrpSpPr>
+        <p:cNvPr id="1" name=""/>
+        <p:cNvGrpSpPr/>
+        <p:nvPr/>
+      </p:nvGrpSpPr>
+      <p:grpSpPr>
+        <a:xfrm>
+          <a:off x="0" y="0"/>
+          <a:ext cx="0" cy="0"/>
+          <a:chOff x="0" y="0"/>
+          <a:chExt cx="0" cy="0"/>
+        </a:xfrm>
+      </p:grpSpPr>
+      <p:sp>
+        <p:nvSpPr>
+          <p:cNvPr id="2" name="Title 1">
+            <a:extLst>
+              <a:ext uri="{FF2B5EF4-FFF2-40B4-BE49-F238E27FC236}">
+                <a16:creationId xmlns:a16="http://schemas.microsoft.com/office/drawing/2014/main" id="{9072E94B-8B12-4523-9797-B0AF0D4D8234}"/>
+              </a:ext>
+            </a:extLst>
+          </p:cNvPr>
+          <p:cNvSpPr>
+            <a:spLocks noGrp="1"/>
+          </p:cNvSpPr>
+          <p:nvPr>
+            <p:ph type="title"/>
+          </p:nvPr>
+        </p:nvSpPr>
+        <p:spPr/>
+        <p:txBody>
+          <a:bodyPr/>
+          <a:lstStyle/>
+          <a:p>
+            <a:r>
+              <a:rPr lang="en-US" b="0" i="0" dirty="0">
+                <a:solidFill>
+                  <a:srgbClr val="292929"/>
+                </a:solidFill>
+                <a:effectLst/>
+                <a:latin typeface="sohne"/>
+              </a:rPr>
+              <a:t>Azure Kubernetes Service (AKS)</a:t>
+            </a:r>
+            <a:endParaRPr lang="en-US" dirty="0"/>
+          </a:p>
+        </p:txBody>
+      </p:sp>
+      <p:sp>
+        <p:nvSpPr>
+          <p:cNvPr id="3" name="Content Placeholder 2">
+            <a:extLst>
+              <a:ext uri="{FF2B5EF4-FFF2-40B4-BE49-F238E27FC236}">
+                <a16:creationId xmlns:a16="http://schemas.microsoft.com/office/drawing/2014/main" id="{BF4C9623-9BAC-4132-9DC4-F18430A52F16}"/>
+              </a:ext>
+            </a:extLst>
+          </p:cNvPr>
+          <p:cNvSpPr>
+            <a:spLocks noGrp="1"/>
+          </p:cNvSpPr>
+          <p:nvPr>
+            <p:ph idx="1"/>
+          </p:nvPr>
+        </p:nvSpPr>
+        <p:spPr/>
+        <p:txBody>
+          <a:bodyPr>
+            <a:noAutofit/>
+          </a:bodyPr>
+          <a:lstStyle/>
+          <a:p>
+            <a:r>
+              <a:rPr lang="en-US" sz="2400" b="0" i="0" dirty="0">
+                <a:solidFill>
+                  <a:srgbClr val="292929"/>
+                </a:solidFill>
+                <a:effectLst/>
+                <a:latin typeface="charter"/>
+              </a:rPr>
+              <a:t>As you can see that there is several steps to deploy AKS cluster,</a:t>
+            </a:r>
+            <a:br>
+              <a:rPr lang="en-US" sz="2400" dirty="0"/>
+            </a:br>
+            <a:r>
+              <a:rPr lang="en-US" sz="2400" b="0" i="0" dirty="0">
+                <a:solidFill>
+                  <a:srgbClr val="292929"/>
+                </a:solidFill>
+                <a:effectLst/>
+                <a:latin typeface="charter"/>
+              </a:rPr>
+              <a:t>1- Build your docker images</a:t>
+            </a:r>
+            <a:br>
+              <a:rPr lang="en-US" sz="2400" dirty="0"/>
+            </a:br>
+            <a:r>
+              <a:rPr lang="en-US" sz="2400" b="0" i="0" dirty="0">
+                <a:solidFill>
+                  <a:srgbClr val="292929"/>
+                </a:solidFill>
+                <a:effectLst/>
+                <a:latin typeface="charter"/>
+              </a:rPr>
+              <a:t>2- Tag these images according to ACR login name</a:t>
+            </a:r>
+            <a:br>
+              <a:rPr lang="en-US" sz="2400" dirty="0"/>
+            </a:br>
+            <a:r>
+              <a:rPr lang="en-US" sz="2400" b="0" i="0" dirty="0">
+                <a:solidFill>
+                  <a:srgbClr val="292929"/>
+                </a:solidFill>
+                <a:effectLst/>
+                <a:latin typeface="charter"/>
+              </a:rPr>
+              <a:t>3- Create your ACR into Azure subscription and protect with admin user and get the </a:t>
+            </a:r>
+            <a:r>
+              <a:rPr lang="en-US" sz="2400" b="0" i="0" dirty="0" err="1">
+                <a:solidFill>
+                  <a:srgbClr val="292929"/>
+                </a:solidFill>
+                <a:effectLst/>
+                <a:latin typeface="charter"/>
+              </a:rPr>
+              <a:t>loginname</a:t>
+            </a:r>
+            <a:r>
+              <a:rPr lang="en-US" sz="2400" b="0" i="0" dirty="0">
+                <a:solidFill>
+                  <a:srgbClr val="292929"/>
+                </a:solidFill>
+                <a:effectLst/>
+                <a:latin typeface="charter"/>
+              </a:rPr>
+              <a:t> , username and password</a:t>
+            </a:r>
+            <a:br>
+              <a:rPr lang="en-US" sz="2400" dirty="0"/>
+            </a:br>
+            <a:r>
+              <a:rPr lang="en-US" sz="2400" b="0" i="0" dirty="0">
+                <a:solidFill>
+                  <a:srgbClr val="292929"/>
+                </a:solidFill>
+                <a:effectLst/>
+                <a:latin typeface="charter"/>
+              </a:rPr>
+              <a:t>4- Connect to ACR and push your images to ACR</a:t>
+            </a:r>
+            <a:br>
+              <a:rPr lang="en-US" sz="2400" dirty="0"/>
+            </a:br>
+            <a:r>
+              <a:rPr lang="en-US" sz="2400" b="0" i="0" dirty="0">
+                <a:solidFill>
+                  <a:srgbClr val="292929"/>
+                </a:solidFill>
+                <a:effectLst/>
+                <a:latin typeface="charter"/>
+              </a:rPr>
+              <a:t>5- Create your AKS service into Azure subscription, it will take some time.</a:t>
+            </a:r>
+            <a:br>
+              <a:rPr lang="en-US" sz="2400" dirty="0"/>
+            </a:br>
+            <a:r>
+              <a:rPr lang="en-US" sz="2400" b="0" i="0" dirty="0">
+                <a:solidFill>
+                  <a:srgbClr val="292929"/>
+                </a:solidFill>
+                <a:effectLst/>
+                <a:latin typeface="charter"/>
+              </a:rPr>
+              <a:t>6- Build communication with AKS and ACR</a:t>
+            </a:r>
+            <a:br>
+              <a:rPr lang="en-US" sz="2400" dirty="0"/>
+            </a:br>
+            <a:r>
+              <a:rPr lang="en-US" sz="2400" b="0" i="0" dirty="0">
+                <a:solidFill>
+                  <a:srgbClr val="292929"/>
+                </a:solidFill>
+                <a:effectLst/>
+                <a:latin typeface="charter"/>
+              </a:rPr>
+              <a:t>7- Update your k8s manifest files as per AKS deployment, for example change image names docker hub to ACR address.</a:t>
+            </a:r>
+            <a:br>
+              <a:rPr lang="en-US" sz="2400" dirty="0"/>
+            </a:br>
+            <a:r>
+              <a:rPr lang="en-US" sz="2400" b="0" i="0" dirty="0">
+                <a:solidFill>
+                  <a:srgbClr val="292929"/>
+                </a:solidFill>
+                <a:effectLst/>
+                <a:latin typeface="charter"/>
+              </a:rPr>
+              <a:t>8- Run your k8s config files into AKS cluster.</a:t>
+            </a:r>
+            <a:br>
+              <a:rPr lang="en-US" sz="2400" dirty="0"/>
+            </a:br>
+            <a:r>
+              <a:rPr lang="en-US" sz="2400" b="0" i="0" dirty="0">
+                <a:solidFill>
+                  <a:srgbClr val="292929"/>
+                </a:solidFill>
+                <a:effectLst/>
+                <a:latin typeface="charter"/>
+              </a:rPr>
+              <a:t>9- Create load balancer service and test your application from cloud AKS deployment.</a:t>
+            </a:r>
+            <a:endParaRPr lang="en-US" sz="2400" dirty="0"/>
+          </a:p>
+        </p:txBody>
+      </p:sp>
+    </p:spTree>
+    <p:extLst>
+      <p:ext uri="{BB962C8B-B14F-4D97-AF65-F5344CB8AC3E}">
+        <p14:creationId xmlns:p14="http://schemas.microsoft.com/office/powerpoint/2010/main" val="3139715251"/>
+      </p:ext>
+    </p:extLst>
+  </p:cSld>
+  <p:clrMapOvr>
+    <a:masterClrMapping/>
+  </p:clrMapOvr>
+</p:sld>
+</file>
+
+<file path=ppt/slides/slide24.xml><?xml version="1.0" encoding="utf-8"?>
+<p:sld xmlns:a="http://schemas.openxmlformats.org/drawingml/2006/main" xmlns:r="http://schemas.openxmlformats.org/officeDocument/2006/relationships" xmlns:p="http://schemas.openxmlformats.org/presentationml/2006/main">
+  <p:cSld>
+    <p:spTree>
+      <p:nvGrpSpPr>
+        <p:cNvPr id="1" name=""/>
+        <p:cNvGrpSpPr/>
+        <p:nvPr/>
+      </p:nvGrpSpPr>
+      <p:grpSpPr>
+        <a:xfrm>
+          <a:off x="0" y="0"/>
+          <a:ext cx="0" cy="0"/>
+          <a:chOff x="0" y="0"/>
+          <a:chExt cx="0" cy="0"/>
+        </a:xfrm>
+      </p:grpSpPr>
+      <p:sp>
+        <p:nvSpPr>
+          <p:cNvPr id="2" name="Title 1">
+            <a:extLst>
+              <a:ext uri="{FF2B5EF4-FFF2-40B4-BE49-F238E27FC236}">
+                <a16:creationId xmlns:a16="http://schemas.microsoft.com/office/drawing/2014/main" id="{9DF930DE-B06F-4A06-8CA7-22EC6A44C564}"/>
+              </a:ext>
+            </a:extLst>
+          </p:cNvPr>
+          <p:cNvSpPr>
+            <a:spLocks noGrp="1"/>
+          </p:cNvSpPr>
+          <p:nvPr>
+            <p:ph type="title"/>
+          </p:nvPr>
+        </p:nvSpPr>
+        <p:spPr/>
+        <p:txBody>
+          <a:bodyPr/>
+          <a:lstStyle/>
+          <a:p>
+            <a:r>
+              <a:rPr lang="en-US" dirty="0"/>
+              <a:t>Azure CLI all the command in the txt</a:t>
+            </a:r>
+          </a:p>
+        </p:txBody>
+      </p:sp>
+      <p:sp>
+        <p:nvSpPr>
+          <p:cNvPr id="3" name="Content Placeholder 2">
+            <a:extLst>
+              <a:ext uri="{FF2B5EF4-FFF2-40B4-BE49-F238E27FC236}">
+                <a16:creationId xmlns:a16="http://schemas.microsoft.com/office/drawing/2014/main" id="{3F9611A5-8727-4E0C-B631-F4312BF63100}"/>
+              </a:ext>
+            </a:extLst>
+          </p:cNvPr>
+          <p:cNvSpPr>
+            <a:spLocks noGrp="1"/>
+          </p:cNvSpPr>
+          <p:nvPr>
+            <p:ph idx="1"/>
+          </p:nvPr>
+        </p:nvSpPr>
+        <p:spPr/>
+        <p:txBody>
+          <a:bodyPr/>
+          <a:lstStyle/>
+          <a:p>
+            <a:r>
+              <a:rPr lang="en-US" dirty="0">
+                <a:hlinkClick r:id="rId2"/>
+              </a:rPr>
+              <a:t>https://docs.microsoft.com/en-us/cli/azure/install-azure-cli-windows?tabs=azure-cli</a:t>
+            </a:r>
+            <a:endParaRPr lang="en-US" dirty="0"/>
+          </a:p>
+          <a:p>
+            <a:r>
+              <a:rPr lang="en-US" dirty="0" err="1"/>
+              <a:t>az</a:t>
+            </a:r>
+            <a:r>
+              <a:rPr lang="en-US" dirty="0"/>
+              <a:t> --version</a:t>
+            </a:r>
+          </a:p>
+          <a:p>
+            <a:r>
+              <a:rPr lang="en-US" dirty="0" err="1"/>
+              <a:t>az</a:t>
+            </a:r>
+            <a:r>
+              <a:rPr lang="en-US" dirty="0"/>
+              <a:t> login</a:t>
+            </a:r>
+          </a:p>
+          <a:p>
+            <a:r>
+              <a:rPr lang="en-US" dirty="0" err="1"/>
+              <a:t>az</a:t>
+            </a:r>
+            <a:r>
+              <a:rPr lang="en-US" dirty="0"/>
+              <a:t> group create --name </a:t>
+            </a:r>
+            <a:r>
+              <a:rPr lang="en-US" dirty="0" err="1"/>
+              <a:t>myResourceGroup</a:t>
+            </a:r>
+            <a:r>
+              <a:rPr lang="en-US" dirty="0"/>
+              <a:t> --location </a:t>
+            </a:r>
+            <a:r>
+              <a:rPr lang="en-US" dirty="0" err="1"/>
+              <a:t>centralus</a:t>
+            </a:r>
+            <a:endParaRPr lang="en-US" dirty="0"/>
+          </a:p>
+          <a:p>
+            <a:r>
+              <a:rPr lang="en-US" dirty="0" err="1"/>
+              <a:t>az</a:t>
+            </a:r>
+            <a:r>
+              <a:rPr lang="en-US" dirty="0"/>
+              <a:t> </a:t>
+            </a:r>
+            <a:r>
+              <a:rPr lang="en-US" dirty="0" err="1"/>
+              <a:t>acr</a:t>
+            </a:r>
+            <a:r>
+              <a:rPr lang="en-US" dirty="0"/>
+              <a:t> create --resource-group </a:t>
+            </a:r>
+            <a:r>
+              <a:rPr lang="en-US" dirty="0" err="1"/>
+              <a:t>myResourceGroup</a:t>
+            </a:r>
+            <a:r>
+              <a:rPr lang="en-US" dirty="0"/>
+              <a:t> --name </a:t>
+            </a:r>
+            <a:r>
+              <a:rPr lang="en-US" dirty="0" err="1"/>
+              <a:t>shoppingappxuexu</a:t>
+            </a:r>
+            <a:r>
+              <a:rPr lang="en-US" dirty="0"/>
+              <a:t> --</a:t>
+            </a:r>
+            <a:r>
+              <a:rPr lang="en-US" dirty="0" err="1"/>
+              <a:t>sku</a:t>
+            </a:r>
+            <a:r>
+              <a:rPr lang="en-US" dirty="0"/>
+              <a:t> Basic</a:t>
+            </a:r>
+          </a:p>
+          <a:p>
+            <a:r>
+              <a:rPr lang="en-US" dirty="0" err="1"/>
+              <a:t>az</a:t>
+            </a:r>
+            <a:r>
+              <a:rPr lang="en-US" dirty="0"/>
+              <a:t> </a:t>
+            </a:r>
+            <a:r>
+              <a:rPr lang="en-US" dirty="0" err="1"/>
+              <a:t>acr</a:t>
+            </a:r>
+            <a:r>
+              <a:rPr lang="en-US" dirty="0"/>
+              <a:t> update -n </a:t>
+            </a:r>
+            <a:r>
+              <a:rPr lang="en-US" dirty="0" err="1"/>
+              <a:t>shoppingappxuexu</a:t>
+            </a:r>
+            <a:r>
+              <a:rPr lang="en-US" dirty="0"/>
+              <a:t> --admin-enabled true</a:t>
+            </a:r>
+          </a:p>
+          <a:p>
+            <a:r>
+              <a:rPr lang="en-US" dirty="0" err="1"/>
+              <a:t>az</a:t>
+            </a:r>
+            <a:r>
+              <a:rPr lang="en-US" dirty="0"/>
+              <a:t> </a:t>
+            </a:r>
+            <a:r>
+              <a:rPr lang="en-US" dirty="0" err="1"/>
+              <a:t>acr</a:t>
+            </a:r>
+            <a:r>
+              <a:rPr lang="en-US" dirty="0"/>
+              <a:t> login --name </a:t>
+            </a:r>
+            <a:r>
+              <a:rPr lang="en-US" dirty="0" err="1"/>
+              <a:t>shoppingappxuexu</a:t>
+            </a:r>
+            <a:endParaRPr lang="en-US" dirty="0"/>
+          </a:p>
+        </p:txBody>
+      </p:sp>
+    </p:spTree>
+    <p:extLst>
+      <p:ext uri="{BB962C8B-B14F-4D97-AF65-F5344CB8AC3E}">
+        <p14:creationId xmlns:p14="http://schemas.microsoft.com/office/powerpoint/2010/main" val="2740920070"/>
+      </p:ext>
+    </p:extLst>
+  </p:cSld>
+  <p:clrMapOvr>
+    <a:masterClrMapping/>
+  </p:clrMapOvr>
+</p:sld>
+</file>
+
+<file path=ppt/slides/slide25.xml><?xml version="1.0" encoding="utf-8"?>
+<p:sld xmlns:a="http://schemas.openxmlformats.org/drawingml/2006/main" xmlns:r="http://schemas.openxmlformats.org/officeDocument/2006/relationships" xmlns:p="http://schemas.openxmlformats.org/presentationml/2006/main">
+  <p:cSld>
+    <p:spTree>
+      <p:nvGrpSpPr>
+        <p:cNvPr id="1" name=""/>
+        <p:cNvGrpSpPr/>
+        <p:nvPr/>
+      </p:nvGrpSpPr>
+      <p:grpSpPr>
+        <a:xfrm>
+          <a:off x="0" y="0"/>
+          <a:ext cx="0" cy="0"/>
+          <a:chOff x="0" y="0"/>
+          <a:chExt cx="0" cy="0"/>
+        </a:xfrm>
+      </p:grpSpPr>
+      <p:sp>
+        <p:nvSpPr>
+          <p:cNvPr id="2" name="Title 1">
+            <a:extLst>
+              <a:ext uri="{FF2B5EF4-FFF2-40B4-BE49-F238E27FC236}">
+                <a16:creationId xmlns:a16="http://schemas.microsoft.com/office/drawing/2014/main" id="{4C7494E5-2163-4E57-8C37-41450B2D4A37}"/>
+              </a:ext>
+            </a:extLst>
+          </p:cNvPr>
+          <p:cNvSpPr>
+            <a:spLocks noGrp="1"/>
+          </p:cNvSpPr>
+          <p:nvPr>
+            <p:ph type="title"/>
+          </p:nvPr>
+        </p:nvSpPr>
+        <p:spPr/>
+        <p:txBody>
+          <a:bodyPr/>
+          <a:lstStyle/>
+          <a:p>
+            <a:r>
+              <a:rPr lang="en-US" dirty="0"/>
+              <a:t>Create Image Pull Secret for ACR Container</a:t>
+            </a:r>
+          </a:p>
+        </p:txBody>
+      </p:sp>
+      <p:sp>
+        <p:nvSpPr>
+          <p:cNvPr id="3" name="Content Placeholder 2">
+            <a:extLst>
+              <a:ext uri="{FF2B5EF4-FFF2-40B4-BE49-F238E27FC236}">
+                <a16:creationId xmlns:a16="http://schemas.microsoft.com/office/drawing/2014/main" id="{08D28709-A93F-4288-AF9B-65B050836DE7}"/>
+              </a:ext>
+            </a:extLst>
+          </p:cNvPr>
+          <p:cNvSpPr>
+            <a:spLocks noGrp="1"/>
+          </p:cNvSpPr>
+          <p:nvPr>
+            <p:ph idx="1"/>
+          </p:nvPr>
+        </p:nvSpPr>
+        <p:spPr/>
+        <p:txBody>
+          <a:bodyPr/>
+          <a:lstStyle/>
+          <a:p>
+            <a:r>
+              <a:rPr lang="en-US" dirty="0" err="1"/>
+              <a:t>kubectl</a:t>
+            </a:r>
+            <a:r>
+              <a:rPr lang="en-US" dirty="0"/>
+              <a:t> create secret docker-registry </a:t>
+            </a:r>
+            <a:r>
+              <a:rPr lang="en-US" dirty="0" err="1"/>
+              <a:t>acr</a:t>
+            </a:r>
+            <a:r>
+              <a:rPr lang="en-US" dirty="0"/>
+              <a:t>-secret --docker-server=shoppingappxuexu.azurecr.io --docker-username=</a:t>
+            </a:r>
+            <a:r>
+              <a:rPr lang="en-US" dirty="0" err="1"/>
+              <a:t>shoppingappxuexu</a:t>
+            </a:r>
+            <a:r>
+              <a:rPr lang="en-US" dirty="0"/>
+              <a:t> --docker-password=tPICmL7DwjTiXPO/OFHCgR3KvFt7lkFr </a:t>
+            </a:r>
+            <a:r>
+              <a:rPr lang="en-US" dirty="0">
+                <a:hlinkClick r:id="rId2"/>
+              </a:rPr>
+              <a:t>--docker-email=xxue60@gatech.edu</a:t>
+            </a:r>
+            <a:endParaRPr lang="en-US" dirty="0"/>
+          </a:p>
+          <a:p>
+            <a:r>
+              <a:rPr lang="en-US" dirty="0" err="1"/>
+              <a:t>kubectl</a:t>
+            </a:r>
+            <a:r>
+              <a:rPr lang="en-US" dirty="0"/>
+              <a:t> get secret</a:t>
+            </a:r>
+          </a:p>
+        </p:txBody>
+      </p:sp>
+    </p:spTree>
+    <p:extLst>
+      <p:ext uri="{BB962C8B-B14F-4D97-AF65-F5344CB8AC3E}">
+        <p14:creationId xmlns:p14="http://schemas.microsoft.com/office/powerpoint/2010/main" val="3830869619"/>
+      </p:ext>
+    </p:extLst>
+  </p:cSld>
+  <p:clrMapOvr>
+    <a:masterClrMapping/>
+  </p:clrMapOvr>
+</p:sld>
+</file>
+
+<file path=ppt/slides/slide26.xml><?xml version="1.0" encoding="utf-8"?>
+<p:sld xmlns:a="http://schemas.openxmlformats.org/drawingml/2006/main" xmlns:r="http://schemas.openxmlformats.org/officeDocument/2006/relationships" xmlns:p="http://schemas.openxmlformats.org/presentationml/2006/main">
+  <p:cSld>
+    <p:spTree>
+      <p:nvGrpSpPr>
+        <p:cNvPr id="1" name=""/>
+        <p:cNvGrpSpPr/>
+        <p:nvPr/>
+      </p:nvGrpSpPr>
+      <p:grpSpPr>
+        <a:xfrm>
+          <a:off x="0" y="0"/>
+          <a:ext cx="0" cy="0"/>
+          <a:chOff x="0" y="0"/>
+          <a:chExt cx="0" cy="0"/>
+        </a:xfrm>
+      </p:grpSpPr>
+      <p:sp>
+        <p:nvSpPr>
+          <p:cNvPr id="2" name="Title 1">
+            <a:extLst>
+              <a:ext uri="{FF2B5EF4-FFF2-40B4-BE49-F238E27FC236}">
+                <a16:creationId xmlns:a16="http://schemas.microsoft.com/office/drawing/2014/main" id="{3C2B5639-E5B8-4F8E-9E76-7EA6D97980B6}"/>
+              </a:ext>
+            </a:extLst>
+          </p:cNvPr>
+          <p:cNvSpPr>
+            <a:spLocks noGrp="1"/>
+          </p:cNvSpPr>
+          <p:nvPr>
+            <p:ph type="title"/>
+          </p:nvPr>
+        </p:nvSpPr>
+        <p:spPr/>
+        <p:txBody>
+          <a:bodyPr/>
+          <a:lstStyle/>
+          <a:p>
+            <a:r>
+              <a:rPr lang="en-US" dirty="0"/>
+              <a:t>Run k8s For Deploying AKS</a:t>
+            </a:r>
+          </a:p>
+        </p:txBody>
+      </p:sp>
+      <p:sp>
+        <p:nvSpPr>
+          <p:cNvPr id="3" name="Content Placeholder 2">
+            <a:extLst>
+              <a:ext uri="{FF2B5EF4-FFF2-40B4-BE49-F238E27FC236}">
+                <a16:creationId xmlns:a16="http://schemas.microsoft.com/office/drawing/2014/main" id="{F0235F8A-986D-443C-B588-DE5DFF2D9A46}"/>
+              </a:ext>
+            </a:extLst>
+          </p:cNvPr>
+          <p:cNvSpPr>
+            <a:spLocks noGrp="1"/>
+          </p:cNvSpPr>
+          <p:nvPr>
+            <p:ph idx="1"/>
+          </p:nvPr>
+        </p:nvSpPr>
+        <p:spPr/>
+        <p:txBody>
+          <a:bodyPr/>
+          <a:lstStyle/>
+          <a:p>
+            <a:r>
+              <a:rPr lang="en-US" dirty="0" err="1"/>
+              <a:t>kubectl</a:t>
+            </a:r>
+            <a:r>
+              <a:rPr lang="en-US" dirty="0"/>
+              <a:t> get svc</a:t>
+            </a:r>
+          </a:p>
+        </p:txBody>
+      </p:sp>
+    </p:spTree>
+    <p:extLst>
+      <p:ext uri="{BB962C8B-B14F-4D97-AF65-F5344CB8AC3E}">
+        <p14:creationId xmlns:p14="http://schemas.microsoft.com/office/powerpoint/2010/main" val="4120183963"/>
+      </p:ext>
+    </p:extLst>
+  </p:cSld>
+  <p:clrMapOvr>
+    <a:masterClrMapping/>
+  </p:clrMapOvr>
+</p:sld>
+</file>
+
+<file path=ppt/slides/slide27.xml><?xml version="1.0" encoding="utf-8"?>
+<p:sld xmlns:a="http://schemas.openxmlformats.org/drawingml/2006/main" xmlns:r="http://schemas.openxmlformats.org/officeDocument/2006/relationships" xmlns:p="http://schemas.openxmlformats.org/presentationml/2006/main">
+  <p:cSld>
+    <p:spTree>
+      <p:nvGrpSpPr>
+        <p:cNvPr id="1" name=""/>
+        <p:cNvGrpSpPr/>
+        <p:nvPr/>
+      </p:nvGrpSpPr>
+      <p:grpSpPr>
+        <a:xfrm>
+          <a:off x="0" y="0"/>
+          <a:ext cx="0" cy="0"/>
+          <a:chOff x="0" y="0"/>
+          <a:chExt cx="0" cy="0"/>
+        </a:xfrm>
+      </p:grpSpPr>
+      <p:sp>
+        <p:nvSpPr>
+          <p:cNvPr id="2" name="Title 1">
+            <a:extLst>
+              <a:ext uri="{FF2B5EF4-FFF2-40B4-BE49-F238E27FC236}">
+                <a16:creationId xmlns:a16="http://schemas.microsoft.com/office/drawing/2014/main" id="{E0B18E2F-89F1-48E2-925E-D738B9FD2C6D}"/>
+              </a:ext>
+            </a:extLst>
+          </p:cNvPr>
+          <p:cNvSpPr>
+            <a:spLocks noGrp="1"/>
+          </p:cNvSpPr>
+          <p:nvPr>
+            <p:ph type="title"/>
+          </p:nvPr>
+        </p:nvSpPr>
+        <p:spPr/>
+        <p:txBody>
+          <a:bodyPr/>
+          <a:lstStyle/>
+          <a:p>
+            <a:r>
+              <a:rPr lang="en-US" dirty="0"/>
+              <a:t>Scale Shopping application</a:t>
+            </a:r>
+          </a:p>
+        </p:txBody>
+      </p:sp>
+      <p:sp>
+        <p:nvSpPr>
+          <p:cNvPr id="3" name="Content Placeholder 2">
+            <a:extLst>
+              <a:ext uri="{FF2B5EF4-FFF2-40B4-BE49-F238E27FC236}">
+                <a16:creationId xmlns:a16="http://schemas.microsoft.com/office/drawing/2014/main" id="{95060B7B-27B0-4469-96FB-557C5BBCCF18}"/>
+              </a:ext>
+            </a:extLst>
+          </p:cNvPr>
+          <p:cNvSpPr>
+            <a:spLocks noGrp="1"/>
+          </p:cNvSpPr>
+          <p:nvPr>
+            <p:ph idx="1"/>
+          </p:nvPr>
+        </p:nvSpPr>
+        <p:spPr/>
+        <p:txBody>
+          <a:bodyPr/>
+          <a:lstStyle/>
+          <a:p>
+            <a:r>
+              <a:rPr lang="en-US" dirty="0" err="1"/>
+              <a:t>kubectl</a:t>
+            </a:r>
+            <a:r>
+              <a:rPr lang="en-US" dirty="0"/>
+              <a:t> scale --replicas=3 </a:t>
+            </a:r>
+            <a:r>
+              <a:rPr lang="en-US" dirty="0" err="1"/>
+              <a:t>deployment.apps</a:t>
+            </a:r>
+            <a:r>
+              <a:rPr lang="en-US" dirty="0"/>
+              <a:t>/</a:t>
+            </a:r>
+            <a:r>
+              <a:rPr lang="en-US" dirty="0" err="1"/>
+              <a:t>shoppingclient</a:t>
+            </a:r>
+            <a:r>
+              <a:rPr lang="en-US" dirty="0"/>
+              <a:t>-deployment</a:t>
+            </a:r>
+          </a:p>
+        </p:txBody>
+      </p:sp>
+    </p:spTree>
+    <p:extLst>
+      <p:ext uri="{BB962C8B-B14F-4D97-AF65-F5344CB8AC3E}">
+        <p14:creationId xmlns:p14="http://schemas.microsoft.com/office/powerpoint/2010/main" val="2105803061"/>
+      </p:ext>
+    </p:extLst>
+  </p:cSld>
+  <p:clrMapOvr>
+    <a:masterClrMapping/>
+  </p:clrMapOvr>
+</p:sld>
+</file>
+
+<file path=ppt/slides/slide28.xml><?xml version="1.0" encoding="utf-8"?>
+<p:sld xmlns:a="http://schemas.openxmlformats.org/drawingml/2006/main" xmlns:r="http://schemas.openxmlformats.org/officeDocument/2006/relationships" xmlns:p="http://schemas.openxmlformats.org/presentationml/2006/main">
+  <p:cSld>
+    <p:spTree>
+      <p:nvGrpSpPr>
+        <p:cNvPr id="1" name=""/>
+        <p:cNvGrpSpPr/>
+        <p:nvPr/>
+      </p:nvGrpSpPr>
+      <p:grpSpPr>
+        <a:xfrm>
+          <a:off x="0" y="0"/>
+          <a:ext cx="0" cy="0"/>
+          <a:chOff x="0" y="0"/>
+          <a:chExt cx="0" cy="0"/>
+        </a:xfrm>
+      </p:grpSpPr>
+      <p:sp>
+        <p:nvSpPr>
+          <p:cNvPr id="2" name="Title 1">
+            <a:extLst>
+              <a:ext uri="{FF2B5EF4-FFF2-40B4-BE49-F238E27FC236}">
+                <a16:creationId xmlns:a16="http://schemas.microsoft.com/office/drawing/2014/main" id="{8E8EA83C-0230-4484-8B93-F1E14533D384}"/>
+              </a:ext>
+            </a:extLst>
+          </p:cNvPr>
+          <p:cNvSpPr>
+            <a:spLocks noGrp="1"/>
+          </p:cNvSpPr>
+          <p:nvPr>
+            <p:ph type="title"/>
+          </p:nvPr>
+        </p:nvSpPr>
+        <p:spPr/>
+        <p:txBody>
+          <a:bodyPr/>
+          <a:lstStyle/>
+          <a:p>
+            <a:r>
+              <a:rPr lang="en-US" dirty="0" err="1"/>
+              <a:t>Autoscale</a:t>
+            </a:r>
+            <a:r>
+              <a:rPr lang="en-US" dirty="0"/>
+              <a:t> AKS Service</a:t>
+            </a:r>
+          </a:p>
+        </p:txBody>
+      </p:sp>
+      <p:sp>
+        <p:nvSpPr>
+          <p:cNvPr id="3" name="Content Placeholder 2">
+            <a:extLst>
+              <a:ext uri="{FF2B5EF4-FFF2-40B4-BE49-F238E27FC236}">
+                <a16:creationId xmlns:a16="http://schemas.microsoft.com/office/drawing/2014/main" id="{4627F665-9484-4637-85B3-34892759D639}"/>
+              </a:ext>
+            </a:extLst>
+          </p:cNvPr>
+          <p:cNvSpPr>
+            <a:spLocks noGrp="1"/>
+          </p:cNvSpPr>
+          <p:nvPr>
+            <p:ph idx="1"/>
+          </p:nvPr>
+        </p:nvSpPr>
+        <p:spPr/>
+        <p:txBody>
+          <a:bodyPr/>
+          <a:lstStyle/>
+          <a:p>
+            <a:r>
+              <a:rPr lang="en-US" dirty="0" err="1"/>
+              <a:t>az</a:t>
+            </a:r>
+            <a:r>
+              <a:rPr lang="en-US" dirty="0"/>
+              <a:t> </a:t>
+            </a:r>
+            <a:r>
+              <a:rPr lang="en-US" dirty="0" err="1"/>
+              <a:t>aks</a:t>
+            </a:r>
+            <a:r>
+              <a:rPr lang="en-US" dirty="0"/>
+              <a:t> show --resource-group </a:t>
+            </a:r>
+            <a:r>
+              <a:rPr lang="en-US" dirty="0" err="1"/>
+              <a:t>myResourceGroup</a:t>
+            </a:r>
+            <a:r>
+              <a:rPr lang="en-US" dirty="0"/>
+              <a:t> --name </a:t>
+            </a:r>
+            <a:r>
+              <a:rPr lang="en-US" dirty="0" err="1"/>
+              <a:t>myAKSCluster</a:t>
+            </a:r>
+            <a:r>
+              <a:rPr lang="en-US" dirty="0"/>
+              <a:t> --query </a:t>
+            </a:r>
+            <a:r>
+              <a:rPr lang="en-US" dirty="0" err="1"/>
+              <a:t>kubernetesVersion</a:t>
+            </a:r>
+            <a:r>
+              <a:rPr lang="en-US" dirty="0"/>
+              <a:t> --output table</a:t>
+            </a:r>
+          </a:p>
+          <a:p>
+            <a:endParaRPr lang="en-US" dirty="0"/>
+          </a:p>
+          <a:p>
+            <a:r>
+              <a:rPr lang="en-US" dirty="0" err="1"/>
+              <a:t>Kubectl</a:t>
+            </a:r>
+            <a:r>
+              <a:rPr lang="en-US" dirty="0"/>
+              <a:t> get </a:t>
+            </a:r>
+            <a:r>
+              <a:rPr lang="en-US" dirty="0" err="1"/>
+              <a:t>hpa</a:t>
+            </a:r>
+            <a:endParaRPr lang="en-US" dirty="0"/>
+          </a:p>
+        </p:txBody>
+      </p:sp>
+    </p:spTree>
+    <p:extLst>
+      <p:ext uri="{BB962C8B-B14F-4D97-AF65-F5344CB8AC3E}">
+        <p14:creationId xmlns:p14="http://schemas.microsoft.com/office/powerpoint/2010/main" val="2568817344"/>
+      </p:ext>
+    </p:extLst>
+  </p:cSld>
+  <p:clrMapOvr>
+    <a:masterClrMapping/>
+  </p:clrMapOvr>
+</p:sld>
+</file>
+
+<file path=ppt/slides/slide29.xml><?xml version="1.0" encoding="utf-8"?>
+<p:sld xmlns:a="http://schemas.openxmlformats.org/drawingml/2006/main" xmlns:r="http://schemas.openxmlformats.org/officeDocument/2006/relationships" xmlns:p="http://schemas.openxmlformats.org/presentationml/2006/main">
+  <p:cSld>
+    <p:spTree>
+      <p:nvGrpSpPr>
+        <p:cNvPr id="1" name=""/>
+        <p:cNvGrpSpPr/>
+        <p:nvPr/>
+      </p:nvGrpSpPr>
+      <p:grpSpPr>
+        <a:xfrm>
+          <a:off x="0" y="0"/>
+          <a:ext cx="0" cy="0"/>
+          <a:chOff x="0" y="0"/>
+          <a:chExt cx="0" cy="0"/>
+        </a:xfrm>
+      </p:grpSpPr>
+      <p:sp>
+        <p:nvSpPr>
+          <p:cNvPr id="2" name="Title 1">
+            <a:extLst>
+              <a:ext uri="{FF2B5EF4-FFF2-40B4-BE49-F238E27FC236}">
+                <a16:creationId xmlns:a16="http://schemas.microsoft.com/office/drawing/2014/main" id="{2561F2C5-B10E-40D4-B4B5-F61716570293}"/>
+              </a:ext>
+            </a:extLst>
+          </p:cNvPr>
+          <p:cNvSpPr>
+            <a:spLocks noGrp="1"/>
+          </p:cNvSpPr>
+          <p:nvPr>
+            <p:ph type="title"/>
+          </p:nvPr>
+        </p:nvSpPr>
+        <p:spPr/>
+        <p:txBody>
+          <a:bodyPr/>
+          <a:lstStyle/>
+          <a:p>
+            <a:r>
+              <a:rPr lang="en-US" b="0" i="0" dirty="0">
+                <a:solidFill>
+                  <a:srgbClr val="292929"/>
+                </a:solidFill>
+                <a:effectLst/>
+                <a:latin typeface="sohne"/>
+              </a:rPr>
+              <a:t>Azure </a:t>
+            </a:r>
+            <a:r>
+              <a:rPr lang="en-US" b="0" i="0" dirty="0" err="1">
+                <a:solidFill>
+                  <a:srgbClr val="292929"/>
+                </a:solidFill>
+                <a:effectLst/>
+                <a:latin typeface="sohne"/>
+              </a:rPr>
+              <a:t>Devops</a:t>
+            </a:r>
+            <a:endParaRPr lang="en-US" dirty="0"/>
+          </a:p>
+        </p:txBody>
+      </p:sp>
+      <p:sp>
+        <p:nvSpPr>
+          <p:cNvPr id="3" name="Content Placeholder 2">
+            <a:extLst>
+              <a:ext uri="{FF2B5EF4-FFF2-40B4-BE49-F238E27FC236}">
+                <a16:creationId xmlns:a16="http://schemas.microsoft.com/office/drawing/2014/main" id="{8EDAAFF4-70E8-4C5E-BCC0-6F9DA2A84BCF}"/>
+              </a:ext>
+            </a:extLst>
+          </p:cNvPr>
+          <p:cNvSpPr>
+            <a:spLocks noGrp="1"/>
+          </p:cNvSpPr>
+          <p:nvPr>
+            <p:ph idx="1"/>
+          </p:nvPr>
+        </p:nvSpPr>
+        <p:spPr/>
+        <p:txBody>
+          <a:bodyPr/>
+          <a:lstStyle/>
+          <a:p>
+            <a:endParaRPr lang="en-US"/>
+          </a:p>
+        </p:txBody>
+      </p:sp>
+      <p:pic>
+        <p:nvPicPr>
+          <p:cNvPr id="1026" name="Picture 2">
+            <a:extLst>
+              <a:ext uri="{FF2B5EF4-FFF2-40B4-BE49-F238E27FC236}">
+                <a16:creationId xmlns:a16="http://schemas.microsoft.com/office/drawing/2014/main" id="{01960DDA-8A82-4255-8E6E-6927E02D4438}"/>
+              </a:ext>
+            </a:extLst>
+          </p:cNvPr>
+          <p:cNvPicPr>
+            <a:picLocks noChangeAspect="1" noChangeArrowheads="1"/>
+          </p:cNvPicPr>
+          <p:nvPr/>
+        </p:nvPicPr>
+        <p:blipFill>
+          <a:blip r:embed="rId2">
+            <a:extLst>
+              <a:ext uri="{28A0092B-C50C-407E-A947-70E740481C1C}">
+                <a14:useLocalDpi xmlns:a14="http://schemas.microsoft.com/office/drawing/2010/main" val="0"/>
+              </a:ext>
+            </a:extLst>
+          </a:blip>
+          <a:srcRect/>
+          <a:stretch>
+            <a:fillRect/>
+          </a:stretch>
+        </p:blipFill>
+        <p:spPr bwMode="auto">
+          <a:xfrm>
+            <a:off x="2348976" y="2052638"/>
+            <a:ext cx="7334250" cy="4124325"/>
+          </a:xfrm>
+          <a:prstGeom prst="rect">
+            <a:avLst/>
+          </a:prstGeom>
+          <a:noFill/>
+          <a:extLst>
+            <a:ext uri="{909E8E84-426E-40DD-AFC4-6F175D3DCCD1}">
+              <a14:hiddenFill xmlns:a14="http://schemas.microsoft.com/office/drawing/2010/main">
+                <a:solidFill>
+                  <a:srgbClr val="FFFFFF"/>
+                </a:solidFill>
+              </a14:hiddenFill>
+            </a:ext>
+          </a:extLst>
+        </p:spPr>
+      </p:pic>
+    </p:spTree>
+    <p:extLst>
+      <p:ext uri="{BB962C8B-B14F-4D97-AF65-F5344CB8AC3E}">
+        <p14:creationId xmlns:p14="http://schemas.microsoft.com/office/powerpoint/2010/main" val="1412048783"/>
+      </p:ext>
+    </p:extLst>
+  </p:cSld>
+  <p:clrMapOvr>
+    <a:masterClrMapping/>
+  </p:clrMapOvr>
+</p:sld>
+</file>
+
+<file path=ppt/slides/slide3.xml><?xml version="1.0" encoding="utf-8"?>
+<p:sld xmlns:a="http://schemas.openxmlformats.org/drawingml/2006/main" xmlns:r="http://schemas.openxmlformats.org/officeDocument/2006/relationships" xmlns:p="http://schemas.openxmlformats.org/presentationml/2006/main">
+  <p:cSld>
+    <p:spTree>
+      <p:nvGrpSpPr>
+        <p:cNvPr id="1" name=""/>
+        <p:cNvGrpSpPr/>
+        <p:nvPr/>
+      </p:nvGrpSpPr>
+      <p:grpSpPr>
+        <a:xfrm>
+          <a:off x="0" y="0"/>
+          <a:ext cx="0" cy="0"/>
+          <a:chOff x="0" y="0"/>
+          <a:chExt cx="0" cy="0"/>
+        </a:xfrm>
+      </p:grpSpPr>
+      <p:sp>
+        <p:nvSpPr>
+          <p:cNvPr id="2" name="TextBox 1">
+            <a:extLst>
+              <a:ext uri="{FF2B5EF4-FFF2-40B4-BE49-F238E27FC236}">
+                <a16:creationId xmlns:a16="http://schemas.microsoft.com/office/drawing/2014/main" id="{107390D2-9906-4C61-B46A-97F3C7A41FE9}"/>
+              </a:ext>
+            </a:extLst>
+          </p:cNvPr>
+          <p:cNvSpPr txBox="1"/>
+          <p:nvPr/>
+        </p:nvSpPr>
+        <p:spPr>
+          <a:xfrm>
+            <a:off x="5282214" y="1305017"/>
+            <a:ext cx="1256178" cy="369332"/>
+          </a:xfrm>
+          <a:prstGeom prst="rect">
+            <a:avLst/>
+          </a:prstGeom>
+          <a:noFill/>
+        </p:spPr>
+        <p:txBody>
+          <a:bodyPr wrap="none" rtlCol="0">
+            <a:spAutoFit/>
+          </a:bodyPr>
+          <a:lstStyle/>
+          <a:p>
+            <a:r>
+              <a:rPr lang="en-US" dirty="0"/>
+              <a:t>Kubernetes</a:t>
+            </a:r>
+          </a:p>
+        </p:txBody>
+      </p:sp>
+      <p:sp>
+        <p:nvSpPr>
+          <p:cNvPr id="4" name="TextBox 3">
+            <a:extLst>
+              <a:ext uri="{FF2B5EF4-FFF2-40B4-BE49-F238E27FC236}">
+                <a16:creationId xmlns:a16="http://schemas.microsoft.com/office/drawing/2014/main" id="{F9796172-5F58-48CC-873D-F5367985F959}"/>
+              </a:ext>
+            </a:extLst>
+          </p:cNvPr>
+          <p:cNvSpPr txBox="1"/>
+          <p:nvPr/>
+        </p:nvSpPr>
+        <p:spPr>
+          <a:xfrm>
+            <a:off x="3048740" y="2211409"/>
+            <a:ext cx="6094520" cy="646331"/>
+          </a:xfrm>
+          <a:prstGeom prst="rect">
+            <a:avLst/>
+          </a:prstGeom>
+          <a:noFill/>
+        </p:spPr>
+        <p:txBody>
+          <a:bodyPr wrap="square">
+            <a:spAutoFit/>
+          </a:bodyPr>
+          <a:lstStyle/>
+          <a:p>
+            <a:r>
+              <a:rPr lang="en-US" dirty="0"/>
+              <a:t>https://medium.com/aspnetrun/deploying-microservices-on-kubernetes-35296d369fdb</a:t>
+            </a:r>
+          </a:p>
+        </p:txBody>
+      </p:sp>
+    </p:spTree>
+    <p:extLst>
+      <p:ext uri="{BB962C8B-B14F-4D97-AF65-F5344CB8AC3E}">
+        <p14:creationId xmlns:p14="http://schemas.microsoft.com/office/powerpoint/2010/main" val="211171430"/>
+      </p:ext>
+    </p:extLst>
+  </p:cSld>
+  <p:clrMapOvr>
+    <a:masterClrMapping/>
+  </p:clrMapOvr>
+</p:sld>
+</file>
+
+<file path=ppt/slides/slide30.xml><?xml version="1.0" encoding="utf-8"?>
+<p:sld xmlns:a="http://schemas.openxmlformats.org/drawingml/2006/main" xmlns:r="http://schemas.openxmlformats.org/officeDocument/2006/relationships" xmlns:p="http://schemas.openxmlformats.org/presentationml/2006/main">
+  <p:cSld>
+    <p:spTree>
+      <p:nvGrpSpPr>
+        <p:cNvPr id="1" name=""/>
+        <p:cNvGrpSpPr/>
+        <p:nvPr/>
+      </p:nvGrpSpPr>
+      <p:grpSpPr>
+        <a:xfrm>
+          <a:off x="0" y="0"/>
+          <a:ext cx="0" cy="0"/>
+          <a:chOff x="0" y="0"/>
+          <a:chExt cx="0" cy="0"/>
+        </a:xfrm>
+      </p:grpSpPr>
+      <p:sp>
+        <p:nvSpPr>
+          <p:cNvPr id="2" name="Title 1">
+            <a:extLst>
+              <a:ext uri="{FF2B5EF4-FFF2-40B4-BE49-F238E27FC236}">
+                <a16:creationId xmlns:a16="http://schemas.microsoft.com/office/drawing/2014/main" id="{2561F2C5-B10E-40D4-B4B5-F61716570293}"/>
+              </a:ext>
+            </a:extLst>
+          </p:cNvPr>
+          <p:cNvSpPr>
+            <a:spLocks noGrp="1"/>
+          </p:cNvSpPr>
+          <p:nvPr>
+            <p:ph type="title"/>
+          </p:nvPr>
+        </p:nvSpPr>
+        <p:spPr/>
+        <p:txBody>
+          <a:bodyPr/>
+          <a:lstStyle/>
+          <a:p>
+            <a:r>
+              <a:rPr lang="en-US" b="0" i="0" dirty="0">
+                <a:solidFill>
+                  <a:srgbClr val="292929"/>
+                </a:solidFill>
+                <a:effectLst/>
+                <a:latin typeface="sohne"/>
+              </a:rPr>
+              <a:t>CI/CD</a:t>
+            </a:r>
+            <a:endParaRPr lang="en-US" dirty="0"/>
+          </a:p>
+        </p:txBody>
+      </p:sp>
+      <p:sp>
+        <p:nvSpPr>
+          <p:cNvPr id="3" name="Content Placeholder 2">
+            <a:extLst>
+              <a:ext uri="{FF2B5EF4-FFF2-40B4-BE49-F238E27FC236}">
+                <a16:creationId xmlns:a16="http://schemas.microsoft.com/office/drawing/2014/main" id="{8EDAAFF4-70E8-4C5E-BCC0-6F9DA2A84BCF}"/>
+              </a:ext>
+            </a:extLst>
+          </p:cNvPr>
+          <p:cNvSpPr>
+            <a:spLocks noGrp="1"/>
+          </p:cNvSpPr>
+          <p:nvPr>
+            <p:ph idx="1"/>
+          </p:nvPr>
+        </p:nvSpPr>
+        <p:spPr/>
+        <p:txBody>
+          <a:bodyPr/>
+          <a:lstStyle/>
+          <a:p>
+            <a:endParaRPr lang="en-US"/>
+          </a:p>
+        </p:txBody>
+      </p:sp>
+      <p:pic>
+        <p:nvPicPr>
+          <p:cNvPr id="2050" name="Picture 2">
+            <a:extLst>
+              <a:ext uri="{FF2B5EF4-FFF2-40B4-BE49-F238E27FC236}">
+                <a16:creationId xmlns:a16="http://schemas.microsoft.com/office/drawing/2014/main" id="{D809C6F2-9BDB-4F1D-935B-F3D00386E848}"/>
+              </a:ext>
+            </a:extLst>
+          </p:cNvPr>
+          <p:cNvPicPr>
+            <a:picLocks noChangeAspect="1" noChangeArrowheads="1"/>
+          </p:cNvPicPr>
+          <p:nvPr/>
+        </p:nvPicPr>
+        <p:blipFill>
+          <a:blip r:embed="rId2">
+            <a:extLst>
+              <a:ext uri="{28A0092B-C50C-407E-A947-70E740481C1C}">
+                <a14:useLocalDpi xmlns:a14="http://schemas.microsoft.com/office/drawing/2010/main" val="0"/>
+              </a:ext>
+            </a:extLst>
+          </a:blip>
+          <a:srcRect/>
+          <a:stretch>
+            <a:fillRect/>
+          </a:stretch>
+        </p:blipFill>
+        <p:spPr bwMode="auto">
+          <a:xfrm>
+            <a:off x="2428875" y="1690688"/>
+            <a:ext cx="7334250" cy="3190875"/>
+          </a:xfrm>
+          <a:prstGeom prst="rect">
+            <a:avLst/>
+          </a:prstGeom>
+          <a:noFill/>
+          <a:extLst>
+            <a:ext uri="{909E8E84-426E-40DD-AFC4-6F175D3DCCD1}">
+              <a14:hiddenFill xmlns:a14="http://schemas.microsoft.com/office/drawing/2010/main">
+                <a:solidFill>
+                  <a:srgbClr val="FFFFFF"/>
+                </a:solidFill>
+              </a14:hiddenFill>
+            </a:ext>
+          </a:extLst>
+        </p:spPr>
+      </p:pic>
+      <p:pic>
+        <p:nvPicPr>
+          <p:cNvPr id="2052" name="Picture 4">
+            <a:extLst>
+              <a:ext uri="{FF2B5EF4-FFF2-40B4-BE49-F238E27FC236}">
+                <a16:creationId xmlns:a16="http://schemas.microsoft.com/office/drawing/2014/main" id="{F8055194-8FCB-49FE-AEBD-BF62D3C94D4D}"/>
+              </a:ext>
+            </a:extLst>
+          </p:cNvPr>
+          <p:cNvPicPr>
+            <a:picLocks noChangeAspect="1" noChangeArrowheads="1"/>
+          </p:cNvPicPr>
+          <p:nvPr/>
+        </p:nvPicPr>
+        <p:blipFill>
+          <a:blip r:embed="rId3">
+            <a:extLst>
+              <a:ext uri="{28A0092B-C50C-407E-A947-70E740481C1C}">
+                <a14:useLocalDpi xmlns:a14="http://schemas.microsoft.com/office/drawing/2010/main" val="0"/>
+              </a:ext>
+            </a:extLst>
+          </a:blip>
+          <a:srcRect/>
+          <a:stretch>
+            <a:fillRect/>
+          </a:stretch>
+        </p:blipFill>
+        <p:spPr bwMode="auto">
+          <a:xfrm>
+            <a:off x="2677450" y="4805363"/>
+            <a:ext cx="7334250" cy="1371600"/>
+          </a:xfrm>
+          <a:prstGeom prst="rect">
+            <a:avLst/>
+          </a:prstGeom>
+          <a:noFill/>
+          <a:extLst>
+            <a:ext uri="{909E8E84-426E-40DD-AFC4-6F175D3DCCD1}">
+              <a14:hiddenFill xmlns:a14="http://schemas.microsoft.com/office/drawing/2010/main">
+                <a:solidFill>
+                  <a:srgbClr val="FFFFFF"/>
+                </a:solidFill>
+              </a14:hiddenFill>
+            </a:ext>
+          </a:extLst>
+        </p:spPr>
+      </p:pic>
+    </p:spTree>
+    <p:extLst>
+      <p:ext uri="{BB962C8B-B14F-4D97-AF65-F5344CB8AC3E}">
+        <p14:creationId xmlns:p14="http://schemas.microsoft.com/office/powerpoint/2010/main" val="1674010855"/>
+      </p:ext>
+    </p:extLst>
+  </p:cSld>
+  <p:clrMapOvr>
+    <a:masterClrMapping/>
+  </p:clrMapOvr>
+</p:sld>
+</file>
+
+<file path=ppt/slides/slide4.xml><?xml version="1.0" encoding="utf-8"?>
+<p:sld xmlns:a="http://schemas.openxmlformats.org/drawingml/2006/main" xmlns:r="http://schemas.openxmlformats.org/officeDocument/2006/relationships" xmlns:p="http://schemas.openxmlformats.org/presentationml/2006/main">
+  <p:cSld>
+    <p:spTree>
+      <p:nvGrpSpPr>
+        <p:cNvPr id="1" name=""/>
+        <p:cNvGrpSpPr/>
+        <p:nvPr/>
+      </p:nvGrpSpPr>
+      <p:grpSpPr>
+        <a:xfrm>
+          <a:off x="0" y="0"/>
+          <a:ext cx="0" cy="0"/>
+          <a:chOff x="0" y="0"/>
+          <a:chExt cx="0" cy="0"/>
+        </a:xfrm>
+      </p:grpSpPr>
+      <p:pic>
+        <p:nvPicPr>
+          <p:cNvPr id="1026" name="Picture 2">
+            <a:extLst>
+              <a:ext uri="{FF2B5EF4-FFF2-40B4-BE49-F238E27FC236}">
+                <a16:creationId xmlns:a16="http://schemas.microsoft.com/office/drawing/2014/main" id="{DB9CEF2D-59B1-484C-9DE9-F7BC971F9AAB}"/>
+              </a:ext>
+            </a:extLst>
+          </p:cNvPr>
+          <p:cNvPicPr>
+            <a:picLocks noChangeAspect="1" noChangeArrowheads="1"/>
+          </p:cNvPicPr>
+          <p:nvPr/>
+        </p:nvPicPr>
+        <p:blipFill>
+          <a:blip r:embed="rId2">
+            <a:extLst>
+              <a:ext uri="{28A0092B-C50C-407E-A947-70E740481C1C}">
+                <a14:useLocalDpi xmlns:a14="http://schemas.microsoft.com/office/drawing/2010/main" val="0"/>
+              </a:ext>
+            </a:extLst>
+          </a:blip>
+          <a:srcRect/>
+          <a:stretch>
+            <a:fillRect/>
+          </a:stretch>
+        </p:blipFill>
+        <p:spPr bwMode="auto">
+          <a:xfrm>
+            <a:off x="2428875" y="1047750"/>
+            <a:ext cx="7334250" cy="4762500"/>
+          </a:xfrm>
+          <a:prstGeom prst="rect">
+            <a:avLst/>
+          </a:prstGeom>
+          <a:noFill/>
+          <a:extLst>
+            <a:ext uri="{909E8E84-426E-40DD-AFC4-6F175D3DCCD1}">
+              <a14:hiddenFill xmlns:a14="http://schemas.microsoft.com/office/drawing/2010/main">
+                <a:solidFill>
+                  <a:srgbClr val="FFFFFF"/>
+                </a:solidFill>
+              </a14:hiddenFill>
+            </a:ext>
+          </a:extLst>
+        </p:spPr>
+      </p:pic>
+    </p:spTree>
+    <p:extLst>
+      <p:ext uri="{BB962C8B-B14F-4D97-AF65-F5344CB8AC3E}">
+        <p14:creationId xmlns:p14="http://schemas.microsoft.com/office/powerpoint/2010/main" val="3695187407"/>
+      </p:ext>
+    </p:extLst>
+  </p:cSld>
+  <p:clrMapOvr>
+    <a:masterClrMapping/>
+  </p:clrMapOvr>
+</p:sld>
+</file>
+
+<file path=ppt/slides/slide5.xml><?xml version="1.0" encoding="utf-8"?>
+<p:sld xmlns:a="http://schemas.openxmlformats.org/drawingml/2006/main" xmlns:r="http://schemas.openxmlformats.org/officeDocument/2006/relationships" xmlns:p="http://schemas.openxmlformats.org/presentationml/2006/main">
+  <p:cSld>
+    <p:spTree>
+      <p:nvGrpSpPr>
+        <p:cNvPr id="1" name=""/>
+        <p:cNvGrpSpPr/>
+        <p:nvPr/>
+      </p:nvGrpSpPr>
+      <p:grpSpPr>
+        <a:xfrm>
+          <a:off x="0" y="0"/>
+          <a:ext cx="0" cy="0"/>
+          <a:chOff x="0" y="0"/>
+          <a:chExt cx="0" cy="0"/>
+        </a:xfrm>
+      </p:grpSpPr>
+      <p:pic>
+        <p:nvPicPr>
+          <p:cNvPr id="2050" name="Picture 2">
+            <a:extLst>
+              <a:ext uri="{FF2B5EF4-FFF2-40B4-BE49-F238E27FC236}">
+                <a16:creationId xmlns:a16="http://schemas.microsoft.com/office/drawing/2014/main" id="{536F7BB5-5260-4954-AF29-C36976C1F35B}"/>
+              </a:ext>
+            </a:extLst>
+          </p:cNvPr>
+          <p:cNvPicPr>
+            <a:picLocks noChangeAspect="1" noChangeArrowheads="1"/>
+          </p:cNvPicPr>
+          <p:nvPr/>
+        </p:nvPicPr>
+        <p:blipFill>
+          <a:blip r:embed="rId2">
+            <a:extLst>
+              <a:ext uri="{28A0092B-C50C-407E-A947-70E740481C1C}">
+                <a14:useLocalDpi xmlns:a14="http://schemas.microsoft.com/office/drawing/2010/main" val="0"/>
+              </a:ext>
+            </a:extLst>
+          </a:blip>
+          <a:srcRect/>
+          <a:stretch>
+            <a:fillRect/>
+          </a:stretch>
+        </p:blipFill>
+        <p:spPr bwMode="auto">
+          <a:xfrm>
+            <a:off x="2428875" y="1109663"/>
+            <a:ext cx="7334250" cy="4638675"/>
+          </a:xfrm>
+          <a:prstGeom prst="rect">
+            <a:avLst/>
+          </a:prstGeom>
+          <a:noFill/>
+          <a:extLst>
+            <a:ext uri="{909E8E84-426E-40DD-AFC4-6F175D3DCCD1}">
+              <a14:hiddenFill xmlns:a14="http://schemas.microsoft.com/office/drawing/2010/main">
+                <a:solidFill>
+                  <a:srgbClr val="FFFFFF"/>
+                </a:solidFill>
+              </a14:hiddenFill>
+            </a:ext>
+          </a:extLst>
+        </p:spPr>
+      </p:pic>
+    </p:spTree>
+    <p:extLst>
+      <p:ext uri="{BB962C8B-B14F-4D97-AF65-F5344CB8AC3E}">
+        <p14:creationId xmlns:p14="http://schemas.microsoft.com/office/powerpoint/2010/main" val="3055888155"/>
+      </p:ext>
+    </p:extLst>
+  </p:cSld>
+  <p:clrMapOvr>
+    <a:masterClrMapping/>
+  </p:clrMapOvr>
+</p:sld>
+</file>
+
+<file path=ppt/slides/slide6.xml><?xml version="1.0" encoding="utf-8"?>
+<p:sld xmlns:a="http://schemas.openxmlformats.org/drawingml/2006/main" xmlns:r="http://schemas.openxmlformats.org/officeDocument/2006/relationships" xmlns:p="http://schemas.openxmlformats.org/presentationml/2006/main">
+  <p:cSld>
+    <p:spTree>
+      <p:nvGrpSpPr>
+        <p:cNvPr id="1" name=""/>
+        <p:cNvGrpSpPr/>
+        <p:nvPr/>
+      </p:nvGrpSpPr>
+      <p:grpSpPr>
+        <a:xfrm>
+          <a:off x="0" y="0"/>
+          <a:ext cx="0" cy="0"/>
+          <a:chOff x="0" y="0"/>
+          <a:chExt cx="0" cy="0"/>
+        </a:xfrm>
+      </p:grpSpPr>
+      <p:pic>
+        <p:nvPicPr>
+          <p:cNvPr id="3074" name="Picture 2">
+            <a:extLst>
+              <a:ext uri="{FF2B5EF4-FFF2-40B4-BE49-F238E27FC236}">
+                <a16:creationId xmlns:a16="http://schemas.microsoft.com/office/drawing/2014/main" id="{EA033C6A-5459-4464-92C9-E7BA312E3FB7}"/>
+              </a:ext>
+            </a:extLst>
+          </p:cNvPr>
+          <p:cNvPicPr>
+            <a:picLocks noChangeAspect="1" noChangeArrowheads="1"/>
+          </p:cNvPicPr>
+          <p:nvPr/>
+        </p:nvPicPr>
+        <p:blipFill>
+          <a:blip r:embed="rId2">
+            <a:extLst>
+              <a:ext uri="{28A0092B-C50C-407E-A947-70E740481C1C}">
+                <a14:useLocalDpi xmlns:a14="http://schemas.microsoft.com/office/drawing/2010/main" val="0"/>
+              </a:ext>
+            </a:extLst>
+          </a:blip>
+          <a:srcRect/>
+          <a:stretch>
+            <a:fillRect/>
+          </a:stretch>
+        </p:blipFill>
+        <p:spPr bwMode="auto">
+          <a:xfrm>
+            <a:off x="428625" y="247650"/>
+            <a:ext cx="5667375" cy="6362700"/>
+          </a:xfrm>
+          <a:prstGeom prst="rect">
+            <a:avLst/>
+          </a:prstGeom>
+          <a:noFill/>
+          <a:extLst>
+            <a:ext uri="{909E8E84-426E-40DD-AFC4-6F175D3DCCD1}">
+              <a14:hiddenFill xmlns:a14="http://schemas.microsoft.com/office/drawing/2010/main">
+                <a:solidFill>
+                  <a:srgbClr val="FFFFFF"/>
+                </a:solidFill>
+              </a14:hiddenFill>
+            </a:ext>
+          </a:extLst>
+        </p:spPr>
+      </p:pic>
+      <p:sp>
+        <p:nvSpPr>
+          <p:cNvPr id="4" name="TextBox 3">
+            <a:extLst>
+              <a:ext uri="{FF2B5EF4-FFF2-40B4-BE49-F238E27FC236}">
+                <a16:creationId xmlns:a16="http://schemas.microsoft.com/office/drawing/2014/main" id="{28E96879-57F2-4811-A048-D1CF70636A65}"/>
+              </a:ext>
+            </a:extLst>
+          </p:cNvPr>
+          <p:cNvSpPr txBox="1"/>
+          <p:nvPr/>
+        </p:nvSpPr>
+        <p:spPr>
+          <a:xfrm>
+            <a:off x="5843726" y="2559390"/>
+            <a:ext cx="6094520" cy="1477328"/>
+          </a:xfrm>
+          <a:prstGeom prst="rect">
+            <a:avLst/>
+          </a:prstGeom>
+          <a:noFill/>
+        </p:spPr>
+        <p:txBody>
+          <a:bodyPr wrap="square">
+            <a:spAutoFit/>
+          </a:bodyPr>
+          <a:lstStyle/>
+          <a:p>
+            <a:r>
+              <a:rPr lang="en-US" b="0" i="0" dirty="0">
+                <a:solidFill>
+                  <a:srgbClr val="292929"/>
+                </a:solidFill>
+                <a:effectLst/>
+                <a:latin typeface="charter"/>
+              </a:rPr>
+              <a:t>Deployments are an abstraction of </a:t>
+            </a:r>
+            <a:r>
+              <a:rPr lang="en-US" b="0" i="0" dirty="0" err="1">
+                <a:solidFill>
+                  <a:srgbClr val="292929"/>
+                </a:solidFill>
+                <a:effectLst/>
+                <a:latin typeface="charter"/>
+              </a:rPr>
+              <a:t>ReplicaSets</a:t>
+            </a:r>
+            <a:r>
+              <a:rPr lang="en-US" b="0" i="0" dirty="0">
+                <a:solidFill>
+                  <a:srgbClr val="292929"/>
+                </a:solidFill>
+                <a:effectLst/>
+                <a:latin typeface="charter"/>
+              </a:rPr>
+              <a:t>, and </a:t>
+            </a:r>
+            <a:r>
+              <a:rPr lang="en-US" b="0" i="0" dirty="0" err="1">
+                <a:solidFill>
+                  <a:srgbClr val="292929"/>
+                </a:solidFill>
+                <a:effectLst/>
+                <a:latin typeface="charter"/>
+              </a:rPr>
+              <a:t>ReplicaSets</a:t>
+            </a:r>
+            <a:r>
+              <a:rPr lang="en-US" b="0" i="0" dirty="0">
+                <a:solidFill>
+                  <a:srgbClr val="292929"/>
+                </a:solidFill>
+                <a:effectLst/>
+                <a:latin typeface="charter"/>
+              </a:rPr>
+              <a:t> are an </a:t>
+            </a:r>
+            <a:r>
+              <a:rPr lang="en-US" b="0" i="0" dirty="0" err="1">
+                <a:solidFill>
+                  <a:srgbClr val="292929"/>
+                </a:solidFill>
+                <a:effectLst/>
+                <a:latin typeface="charter"/>
+              </a:rPr>
+              <a:t>abstaction</a:t>
+            </a:r>
+            <a:r>
+              <a:rPr lang="en-US" b="0" i="0" dirty="0">
+                <a:solidFill>
+                  <a:srgbClr val="292929"/>
+                </a:solidFill>
+                <a:effectLst/>
+                <a:latin typeface="charter"/>
+              </a:rPr>
+              <a:t> of Pods. So Pods should not created directly, if needed, Deployment objects should be created and the rest operation will handle by k8s with creating </a:t>
+            </a:r>
+            <a:r>
+              <a:rPr lang="en-US" b="0" i="0" dirty="0" err="1">
+                <a:solidFill>
+                  <a:srgbClr val="292929"/>
+                </a:solidFill>
+                <a:effectLst/>
+                <a:latin typeface="charter"/>
+              </a:rPr>
+              <a:t>replicaset</a:t>
+            </a:r>
+            <a:r>
+              <a:rPr lang="en-US" b="0" i="0" dirty="0">
+                <a:solidFill>
+                  <a:srgbClr val="292929"/>
+                </a:solidFill>
+                <a:effectLst/>
+                <a:latin typeface="charter"/>
+              </a:rPr>
+              <a:t> and pods </a:t>
+            </a:r>
+            <a:r>
+              <a:rPr lang="en-US" b="0" i="0" dirty="0" err="1">
+                <a:solidFill>
+                  <a:srgbClr val="292929"/>
+                </a:solidFill>
+                <a:effectLst/>
+                <a:latin typeface="charter"/>
+              </a:rPr>
+              <a:t>automaticly</a:t>
+            </a:r>
+            <a:r>
+              <a:rPr lang="en-US" b="0" i="0" dirty="0">
+                <a:solidFill>
+                  <a:srgbClr val="292929"/>
+                </a:solidFill>
+                <a:effectLst/>
+                <a:latin typeface="charter"/>
+              </a:rPr>
+              <a:t>.</a:t>
+            </a:r>
+            <a:endParaRPr lang="en-US" dirty="0"/>
+          </a:p>
+        </p:txBody>
+      </p:sp>
+      <p:sp>
+        <p:nvSpPr>
+          <p:cNvPr id="6" name="TextBox 5">
+            <a:extLst>
+              <a:ext uri="{FF2B5EF4-FFF2-40B4-BE49-F238E27FC236}">
+                <a16:creationId xmlns:a16="http://schemas.microsoft.com/office/drawing/2014/main" id="{5DB4DE79-47BF-4F08-94C4-D942FDFBBF20}"/>
+              </a:ext>
+            </a:extLst>
+          </p:cNvPr>
+          <p:cNvSpPr txBox="1"/>
+          <p:nvPr/>
+        </p:nvSpPr>
+        <p:spPr>
+          <a:xfrm>
+            <a:off x="5969863" y="4853411"/>
+            <a:ext cx="6094520" cy="369332"/>
+          </a:xfrm>
+          <a:prstGeom prst="rect">
+            <a:avLst/>
+          </a:prstGeom>
+          <a:noFill/>
+        </p:spPr>
+        <p:txBody>
+          <a:bodyPr wrap="square">
+            <a:spAutoFit/>
+          </a:bodyPr>
+          <a:lstStyle/>
+          <a:p>
+            <a:r>
+              <a:rPr lang="en-US" dirty="0"/>
+              <a:t>https://kubernetes.io/docs/reference/kubectl/cheatsheet/</a:t>
+            </a:r>
+          </a:p>
+        </p:txBody>
+      </p:sp>
+    </p:spTree>
+    <p:extLst>
+      <p:ext uri="{BB962C8B-B14F-4D97-AF65-F5344CB8AC3E}">
+        <p14:creationId xmlns:p14="http://schemas.microsoft.com/office/powerpoint/2010/main" val="2322065483"/>
+      </p:ext>
+    </p:extLst>
+  </p:cSld>
+  <p:clrMapOvr>
+    <a:masterClrMapping/>
+  </p:clrMapOvr>
+</p:sld>
+</file>
+
+<file path=ppt/slides/slide7.xml><?xml version="1.0" encoding="utf-8"?>
+<p:sld xmlns:a="http://schemas.openxmlformats.org/drawingml/2006/main" xmlns:r="http://schemas.openxmlformats.org/officeDocument/2006/relationships" xmlns:p="http://schemas.openxmlformats.org/presentationml/2006/main">
+  <p:cSld>
+    <p:spTree>
+      <p:nvGrpSpPr>
+        <p:cNvPr id="1" name=""/>
+        <p:cNvGrpSpPr/>
+        <p:nvPr/>
+      </p:nvGrpSpPr>
+      <p:grpSpPr>
+        <a:xfrm>
+          <a:off x="0" y="0"/>
+          <a:ext cx="0" cy="0"/>
+          <a:chOff x="0" y="0"/>
+          <a:chExt cx="0" cy="0"/>
+        </a:xfrm>
+      </p:grpSpPr>
+      <p:sp>
+        <p:nvSpPr>
+          <p:cNvPr id="2" name="Title 1">
+            <a:extLst>
+              <a:ext uri="{FF2B5EF4-FFF2-40B4-BE49-F238E27FC236}">
+                <a16:creationId xmlns:a16="http://schemas.microsoft.com/office/drawing/2014/main" id="{E72AACC2-ACE9-4182-AF9D-1D4D6D3648EA}"/>
+              </a:ext>
+            </a:extLst>
+          </p:cNvPr>
+          <p:cNvSpPr>
+            <a:spLocks noGrp="1"/>
+          </p:cNvSpPr>
+          <p:nvPr>
+            <p:ph type="title"/>
+          </p:nvPr>
+        </p:nvSpPr>
+        <p:spPr/>
+        <p:txBody>
+          <a:bodyPr/>
+          <a:lstStyle/>
+          <a:p>
+            <a:r>
+              <a:rPr lang="en-US" dirty="0" err="1"/>
+              <a:t>kubectl</a:t>
+            </a:r>
+            <a:r>
+              <a:rPr lang="en-US" dirty="0"/>
+              <a:t> command</a:t>
+            </a:r>
+          </a:p>
+        </p:txBody>
+      </p:sp>
+      <p:sp>
+        <p:nvSpPr>
+          <p:cNvPr id="3" name="Content Placeholder 2">
+            <a:extLst>
+              <a:ext uri="{FF2B5EF4-FFF2-40B4-BE49-F238E27FC236}">
+                <a16:creationId xmlns:a16="http://schemas.microsoft.com/office/drawing/2014/main" id="{64E3C2C5-AABA-424C-9471-4C79083E49C4}"/>
+              </a:ext>
+            </a:extLst>
+          </p:cNvPr>
+          <p:cNvSpPr>
+            <a:spLocks noGrp="1"/>
+          </p:cNvSpPr>
+          <p:nvPr>
+            <p:ph idx="1"/>
+          </p:nvPr>
+        </p:nvSpPr>
+        <p:spPr/>
+        <p:txBody>
+          <a:bodyPr>
+            <a:normAutofit/>
+          </a:bodyPr>
+          <a:lstStyle/>
+          <a:p>
+            <a:r>
+              <a:rPr lang="en-US" dirty="0" err="1"/>
+              <a:t>kubectl</a:t>
+            </a:r>
+            <a:r>
+              <a:rPr lang="en-US" dirty="0"/>
+              <a:t> cluster-info</a:t>
+            </a:r>
+          </a:p>
+          <a:p>
+            <a:r>
+              <a:rPr lang="en-US" dirty="0" err="1"/>
+              <a:t>kubectl</a:t>
+            </a:r>
+            <a:r>
+              <a:rPr lang="en-US" dirty="0"/>
+              <a:t> version</a:t>
+            </a:r>
+          </a:p>
+          <a:p>
+            <a:r>
+              <a:rPr lang="en-US" dirty="0" err="1"/>
+              <a:t>kubectl</a:t>
+            </a:r>
+            <a:r>
+              <a:rPr lang="en-US" dirty="0"/>
+              <a:t> get nodes</a:t>
+            </a:r>
+          </a:p>
+          <a:p>
+            <a:r>
+              <a:rPr lang="en-US" dirty="0" err="1"/>
+              <a:t>kubectl</a:t>
+            </a:r>
+            <a:r>
+              <a:rPr lang="en-US" dirty="0"/>
+              <a:t> get pod</a:t>
+            </a:r>
+          </a:p>
+          <a:p>
+            <a:r>
+              <a:rPr lang="en-US" dirty="0" err="1"/>
+              <a:t>kubectl</a:t>
+            </a:r>
+            <a:r>
+              <a:rPr lang="en-US" dirty="0"/>
+              <a:t> get services</a:t>
+            </a:r>
+          </a:p>
+          <a:p>
+            <a:r>
+              <a:rPr lang="en-US" dirty="0" err="1"/>
+              <a:t>kubectl</a:t>
+            </a:r>
+            <a:r>
+              <a:rPr lang="en-US" dirty="0"/>
+              <a:t> get deployments</a:t>
+            </a:r>
+          </a:p>
+          <a:p>
+            <a:r>
+              <a:rPr lang="en-US" dirty="0" err="1"/>
+              <a:t>kubectl</a:t>
+            </a:r>
+            <a:r>
+              <a:rPr lang="en-US" dirty="0"/>
+              <a:t> get all</a:t>
+            </a:r>
+          </a:p>
+          <a:p>
+            <a:endParaRPr lang="en-US" dirty="0"/>
+          </a:p>
+          <a:p>
+            <a:endParaRPr lang="en-US" dirty="0"/>
+          </a:p>
+          <a:p>
+            <a:endParaRPr lang="en-US" dirty="0"/>
+          </a:p>
+          <a:p>
+            <a:endParaRPr lang="en-US" dirty="0"/>
+          </a:p>
+        </p:txBody>
+      </p:sp>
+    </p:spTree>
+    <p:extLst>
+      <p:ext uri="{BB962C8B-B14F-4D97-AF65-F5344CB8AC3E}">
+        <p14:creationId xmlns:p14="http://schemas.microsoft.com/office/powerpoint/2010/main" val="667281312"/>
+      </p:ext>
+    </p:extLst>
+  </p:cSld>
+  <p:clrMapOvr>
+    <a:masterClrMapping/>
+  </p:clrMapOvr>
+</p:sld>
+</file>
+
+<file path=ppt/slides/slide8.xml><?xml version="1.0" encoding="utf-8"?>
+<p:sld xmlns:a="http://schemas.openxmlformats.org/drawingml/2006/main" xmlns:r="http://schemas.openxmlformats.org/officeDocument/2006/relationships" xmlns:p="http://schemas.openxmlformats.org/presentationml/2006/main">
+  <p:cSld>
+    <p:spTree>
+      <p:nvGrpSpPr>
+        <p:cNvPr id="1" name=""/>
+        <p:cNvGrpSpPr/>
+        <p:nvPr/>
+      </p:nvGrpSpPr>
+      <p:grpSpPr>
+        <a:xfrm>
+          <a:off x="0" y="0"/>
+          <a:ext cx="0" cy="0"/>
+          <a:chOff x="0" y="0"/>
+          <a:chExt cx="0" cy="0"/>
+        </a:xfrm>
+      </p:grpSpPr>
+      <p:pic>
+        <p:nvPicPr>
+          <p:cNvPr id="3" name="Picture 2">
+            <a:extLst>
+              <a:ext uri="{FF2B5EF4-FFF2-40B4-BE49-F238E27FC236}">
+                <a16:creationId xmlns:a16="http://schemas.microsoft.com/office/drawing/2014/main" id="{E8635613-9423-48BB-89CC-E7944C9FCD59}"/>
+              </a:ext>
+            </a:extLst>
+          </p:cNvPr>
+          <p:cNvPicPr>
+            <a:picLocks noChangeAspect="1"/>
+          </p:cNvPicPr>
+          <p:nvPr/>
+        </p:nvPicPr>
+        <p:blipFill>
+          <a:blip r:embed="rId2"/>
+          <a:stretch>
+            <a:fillRect/>
+          </a:stretch>
+        </p:blipFill>
+        <p:spPr>
+          <a:xfrm>
+            <a:off x="2462212" y="310117"/>
+            <a:ext cx="7267575" cy="5438775"/>
+          </a:xfrm>
+          <a:prstGeom prst="rect">
+            <a:avLst/>
+          </a:prstGeom>
+        </p:spPr>
+      </p:pic>
+      <p:sp>
+        <p:nvSpPr>
+          <p:cNvPr id="4" name="TextBox 3">
+            <a:extLst>
+              <a:ext uri="{FF2B5EF4-FFF2-40B4-BE49-F238E27FC236}">
+                <a16:creationId xmlns:a16="http://schemas.microsoft.com/office/drawing/2014/main" id="{CF4C9531-0E62-45A5-87AC-1A4D6F6E3A85}"/>
+              </a:ext>
+            </a:extLst>
+          </p:cNvPr>
+          <p:cNvSpPr txBox="1"/>
+          <p:nvPr/>
+        </p:nvSpPr>
+        <p:spPr>
+          <a:xfrm>
+            <a:off x="1562470" y="3737499"/>
+            <a:ext cx="5171224" cy="369332"/>
+          </a:xfrm>
+          <a:prstGeom prst="rect">
+            <a:avLst/>
+          </a:prstGeom>
+          <a:noFill/>
+        </p:spPr>
+        <p:txBody>
+          <a:bodyPr wrap="none" rtlCol="0">
+            <a:spAutoFit/>
+          </a:bodyPr>
+          <a:lstStyle/>
+          <a:p>
+            <a:r>
+              <a:rPr lang="en-US" dirty="0" err="1"/>
+              <a:t>kubectl</a:t>
+            </a:r>
+            <a:r>
+              <a:rPr lang="en-US" dirty="0"/>
+              <a:t> run </a:t>
+            </a:r>
+            <a:r>
+              <a:rPr lang="en-US" dirty="0" err="1"/>
+              <a:t>myapp</a:t>
+            </a:r>
+            <a:r>
+              <a:rPr lang="en-US" dirty="0"/>
+              <a:t> --image </a:t>
+            </a:r>
+            <a:r>
+              <a:rPr lang="en-US" dirty="0" err="1"/>
+              <a:t>myrepo:mytag</a:t>
+            </a:r>
+            <a:r>
+              <a:rPr lang="en-US" dirty="0"/>
+              <a:t> –replicas 2</a:t>
+            </a:r>
+          </a:p>
+        </p:txBody>
+      </p:sp>
+      <p:sp>
+        <p:nvSpPr>
+          <p:cNvPr id="5" name="TextBox 4">
+            <a:extLst>
+              <a:ext uri="{FF2B5EF4-FFF2-40B4-BE49-F238E27FC236}">
+                <a16:creationId xmlns:a16="http://schemas.microsoft.com/office/drawing/2014/main" id="{33CA75A2-B8CC-4CAE-885D-E9E6C39633A7}"/>
+              </a:ext>
+            </a:extLst>
+          </p:cNvPr>
+          <p:cNvSpPr txBox="1"/>
+          <p:nvPr/>
+        </p:nvSpPr>
+        <p:spPr>
+          <a:xfrm>
+            <a:off x="6855041" y="3737499"/>
+            <a:ext cx="2580515" cy="369332"/>
+          </a:xfrm>
+          <a:prstGeom prst="rect">
+            <a:avLst/>
+          </a:prstGeom>
+          <a:noFill/>
+        </p:spPr>
+        <p:txBody>
+          <a:bodyPr wrap="none" rtlCol="0">
+            <a:spAutoFit/>
+          </a:bodyPr>
+          <a:lstStyle/>
+          <a:p>
+            <a:r>
+              <a:rPr lang="en-US" dirty="0" err="1"/>
+              <a:t>kubectl</a:t>
+            </a:r>
+            <a:r>
+              <a:rPr lang="en-US" dirty="0"/>
+              <a:t> apply –f </a:t>
+            </a:r>
+            <a:r>
+              <a:rPr lang="en-US" dirty="0" err="1"/>
+              <a:t>app.yaml</a:t>
+            </a:r>
+            <a:endParaRPr lang="en-US" dirty="0"/>
+          </a:p>
+        </p:txBody>
+      </p:sp>
+    </p:spTree>
+    <p:extLst>
+      <p:ext uri="{BB962C8B-B14F-4D97-AF65-F5344CB8AC3E}">
+        <p14:creationId xmlns:p14="http://schemas.microsoft.com/office/powerpoint/2010/main" val="966863204"/>
+      </p:ext>
+    </p:extLst>
+  </p:cSld>
+  <p:clrMapOvr>
+    <a:masterClrMapping/>
+  </p:clrMapOvr>
+</p:sld>
+</file>
+
+<file path=ppt/slides/slide9.xml><?xml version="1.0" encoding="utf-8"?>
+<p:sld xmlns:a="http://schemas.openxmlformats.org/drawingml/2006/main" xmlns:r="http://schemas.openxmlformats.org/officeDocument/2006/relationships" xmlns:p="http://schemas.openxmlformats.org/presentationml/2006/main">
+  <p:cSld>
+    <p:spTree>
+      <p:nvGrpSpPr>
+        <p:cNvPr id="1" name=""/>
+        <p:cNvGrpSpPr/>
+        <p:nvPr/>
+      </p:nvGrpSpPr>
+      <p:grpSpPr>
+        <a:xfrm>
+          <a:off x="0" y="0"/>
+          <a:ext cx="0" cy="0"/>
+          <a:chOff x="0" y="0"/>
+          <a:chExt cx="0" cy="0"/>
+        </a:xfrm>
+      </p:grpSpPr>
+      <p:sp>
+        <p:nvSpPr>
+          <p:cNvPr id="2" name="Title 1">
+            <a:extLst>
+              <a:ext uri="{FF2B5EF4-FFF2-40B4-BE49-F238E27FC236}">
+                <a16:creationId xmlns:a16="http://schemas.microsoft.com/office/drawing/2014/main" id="{3324485B-D997-4DF6-8D02-E29691486647}"/>
+              </a:ext>
+            </a:extLst>
+          </p:cNvPr>
+          <p:cNvSpPr>
+            <a:spLocks noGrp="1"/>
+          </p:cNvSpPr>
+          <p:nvPr>
+            <p:ph type="title"/>
+          </p:nvPr>
+        </p:nvSpPr>
+        <p:spPr/>
+        <p:txBody>
+          <a:bodyPr/>
+          <a:lstStyle/>
+          <a:p>
+            <a:r>
+              <a:rPr lang="en-US" dirty="0"/>
+              <a:t>Creating Pods on Kubernetes </a:t>
+            </a:r>
+          </a:p>
+        </p:txBody>
+      </p:sp>
+      <p:sp>
+        <p:nvSpPr>
+          <p:cNvPr id="3" name="Content Placeholder 2">
+            <a:extLst>
+              <a:ext uri="{FF2B5EF4-FFF2-40B4-BE49-F238E27FC236}">
+                <a16:creationId xmlns:a16="http://schemas.microsoft.com/office/drawing/2014/main" id="{05D327FB-DC71-48E3-9E2D-DC0057511A96}"/>
+              </a:ext>
+            </a:extLst>
+          </p:cNvPr>
+          <p:cNvSpPr>
+            <a:spLocks noGrp="1"/>
+          </p:cNvSpPr>
+          <p:nvPr>
+            <p:ph idx="1"/>
+          </p:nvPr>
+        </p:nvSpPr>
+        <p:spPr/>
+        <p:txBody>
+          <a:bodyPr/>
+          <a:lstStyle/>
+          <a:p>
+            <a:r>
+              <a:rPr lang="en-US" dirty="0" err="1"/>
+              <a:t>Kubectl</a:t>
+            </a:r>
+            <a:r>
+              <a:rPr lang="en-US" dirty="0"/>
+              <a:t> run </a:t>
+            </a:r>
+            <a:r>
+              <a:rPr lang="en-US" dirty="0" err="1"/>
+              <a:t>swn</a:t>
+            </a:r>
+            <a:r>
+              <a:rPr lang="en-US" dirty="0"/>
+              <a:t>-nginx --image=nginx</a:t>
+            </a:r>
+          </a:p>
+          <a:p>
+            <a:r>
+              <a:rPr lang="en-US" dirty="0" err="1"/>
+              <a:t>Kubectl</a:t>
+            </a:r>
+            <a:r>
+              <a:rPr lang="en-US" dirty="0"/>
+              <a:t> port-forward </a:t>
+            </a:r>
+            <a:r>
+              <a:rPr lang="en-US" dirty="0" err="1"/>
+              <a:t>swn</a:t>
+            </a:r>
+            <a:r>
+              <a:rPr lang="en-US" dirty="0"/>
+              <a:t>-nginx 8080:80</a:t>
+            </a:r>
+          </a:p>
+          <a:p>
+            <a:r>
+              <a:rPr lang="en-US" dirty="0" err="1"/>
+              <a:t>Kubectl</a:t>
+            </a:r>
+            <a:r>
+              <a:rPr lang="en-US" dirty="0"/>
+              <a:t> get pods</a:t>
+            </a:r>
+          </a:p>
+          <a:p>
+            <a:r>
+              <a:rPr lang="en-US" dirty="0" err="1"/>
+              <a:t>Kubectl</a:t>
+            </a:r>
+            <a:r>
+              <a:rPr lang="en-US" dirty="0"/>
+              <a:t> delete pod </a:t>
+            </a:r>
+            <a:r>
+              <a:rPr lang="en-US" dirty="0" err="1"/>
+              <a:t>swn</a:t>
+            </a:r>
+            <a:r>
+              <a:rPr lang="en-US" dirty="0"/>
+              <a:t>-nginx</a:t>
+            </a:r>
+          </a:p>
+          <a:p>
+            <a:endParaRPr lang="en-US" dirty="0"/>
+          </a:p>
+        </p:txBody>
+      </p:sp>
+    </p:spTree>
+    <p:extLst>
+      <p:ext uri="{BB962C8B-B14F-4D97-AF65-F5344CB8AC3E}">
+        <p14:creationId xmlns:p14="http://schemas.microsoft.com/office/powerpoint/2010/main" val="679840295"/>
+      </p:ext>
+    </p:extLst>
+  </p:cSld>
+  <p:clrMapOvr>
+    <a:masterClrMapping/>
+  </p:clrMapOvr>
+</p:sld>
+</file>
+
 <file path=ppt/theme/theme1.xml><?xml version="1.0" encoding="utf-8"?>
 <a:theme xmlns:a="http://schemas.openxmlformats.org/drawingml/2006/main" name="Office Theme">
   <a:themeElements>

</xml_diff>